<commit_message>
How to use setState()?
this.setState () {
    this.state = {
       count: this.state.count + 1
    }
}
</commit_message>
<xml_diff>
--- a/11_SetState.pptx
+++ b/11_SetState.pptx
@@ -5,7 +5,7 @@
     <p:sldMasterId id="2147483648" r:id="rId1"/>
   </p:sldMasterIdLst>
   <p:notesMasterIdLst>
-    <p:notesMasterId r:id="rId22"/>
+    <p:notesMasterId r:id="rId30"/>
   </p:notesMasterIdLst>
   <p:sldIdLst>
     <p:sldId id="256" r:id="rId2"/>
@@ -27,7 +27,15 @@
     <p:sldId id="278" r:id="rId18"/>
     <p:sldId id="276" r:id="rId19"/>
     <p:sldId id="273" r:id="rId20"/>
-    <p:sldId id="259" r:id="rId21"/>
+    <p:sldId id="281" r:id="rId21"/>
+    <p:sldId id="282" r:id="rId22"/>
+    <p:sldId id="283" r:id="rId23"/>
+    <p:sldId id="284" r:id="rId24"/>
+    <p:sldId id="285" r:id="rId25"/>
+    <p:sldId id="286" r:id="rId26"/>
+    <p:sldId id="287" r:id="rId27"/>
+    <p:sldId id="288" r:id="rId28"/>
+    <p:sldId id="259" r:id="rId29"/>
   </p:sldIdLst>
   <p:sldSz cx="9144000" cy="6858000" type="screen4x3"/>
   <p:notesSz cx="6858000" cy="9144000"/>
@@ -228,7 +236,7 @@
             <a:fld id="{6837EDA8-41C8-4B24-A206-13C08A65A6D7}" type="datetimeFigureOut">
               <a:rPr lang="zh-TW" altLang="en-US" smtClean="0"/>
               <a:pPr/>
-              <a:t>2020/4/5</a:t>
+              <a:t>2020/6/28</a:t>
             </a:fld>
             <a:endParaRPr lang="zh-TW" altLang="en-US"/>
           </a:p>
@@ -681,7 +689,7 @@
             <a:fld id="{8B85509C-BD4F-47BF-9B1E-FC2E949B3621}" type="datetime1">
               <a:rPr lang="zh-TW" altLang="en-US" smtClean="0"/>
               <a:pPr/>
-              <a:t>2020/4/5</a:t>
+              <a:t>2020/6/28</a:t>
             </a:fld>
             <a:endParaRPr lang="zh-TW" altLang="en-US"/>
           </a:p>
@@ -854,7 +862,7 @@
             <a:fld id="{42251B24-F787-4C15-8A0F-7AEC20C70069}" type="datetime1">
               <a:rPr lang="zh-TW" altLang="en-US" smtClean="0"/>
               <a:pPr/>
-              <a:t>2020/4/5</a:t>
+              <a:t>2020/6/28</a:t>
             </a:fld>
             <a:endParaRPr lang="zh-TW" altLang="en-US"/>
           </a:p>
@@ -1029,7 +1037,7 @@
             <a:fld id="{9CA0D33C-CE2B-45F1-B8D4-FFD1F131F331}" type="datetime1">
               <a:rPr lang="zh-TW" altLang="en-US" smtClean="0"/>
               <a:pPr/>
-              <a:t>2020/4/5</a:t>
+              <a:t>2020/6/28</a:t>
             </a:fld>
             <a:endParaRPr lang="zh-TW" altLang="en-US"/>
           </a:p>
@@ -1194,7 +1202,7 @@
             <a:fld id="{50B99440-D9EF-40CC-9B52-F6428D9B2C76}" type="datetime1">
               <a:rPr lang="zh-TW" altLang="en-US" smtClean="0"/>
               <a:pPr/>
-              <a:t>2020/4/5</a:t>
+              <a:t>2020/6/28</a:t>
             </a:fld>
             <a:endParaRPr lang="zh-TW" altLang="en-US"/>
           </a:p>
@@ -1436,7 +1444,7 @@
             <a:fld id="{0871BF52-5C6C-4959-8E27-CECB68D39FE4}" type="datetime1">
               <a:rPr lang="zh-TW" altLang="en-US" smtClean="0"/>
               <a:pPr/>
-              <a:t>2020/4/5</a:t>
+              <a:t>2020/6/28</a:t>
             </a:fld>
             <a:endParaRPr lang="zh-TW" altLang="en-US"/>
           </a:p>
@@ -1718,7 +1726,7 @@
             <a:fld id="{DF863F05-2DD9-4EB1-A827-12FD992DE9DC}" type="datetime1">
               <a:rPr lang="zh-TW" altLang="en-US" smtClean="0"/>
               <a:pPr/>
-              <a:t>2020/4/5</a:t>
+              <a:t>2020/6/28</a:t>
             </a:fld>
             <a:endParaRPr lang="zh-TW" altLang="en-US"/>
           </a:p>
@@ -2134,7 +2142,7 @@
             <a:fld id="{6339AF51-4491-4873-A096-75DB6CE47516}" type="datetime1">
               <a:rPr lang="zh-TW" altLang="en-US" smtClean="0"/>
               <a:pPr/>
-              <a:t>2020/4/5</a:t>
+              <a:t>2020/6/28</a:t>
             </a:fld>
             <a:endParaRPr lang="zh-TW" altLang="en-US"/>
           </a:p>
@@ -2248,7 +2256,7 @@
             <a:fld id="{EE4AD9C8-8B9E-40FF-ABE2-858AC2057BBB}" type="datetime1">
               <a:rPr lang="zh-TW" altLang="en-US" smtClean="0"/>
               <a:pPr/>
-              <a:t>2020/4/5</a:t>
+              <a:t>2020/6/28</a:t>
             </a:fld>
             <a:endParaRPr lang="zh-TW" altLang="en-US"/>
           </a:p>
@@ -2340,7 +2348,7 @@
             <a:fld id="{B4784999-BBBE-4BE4-A8D0-877E7D1D66CC}" type="datetime1">
               <a:rPr lang="zh-TW" altLang="en-US" smtClean="0"/>
               <a:pPr/>
-              <a:t>2020/4/5</a:t>
+              <a:t>2020/6/28</a:t>
             </a:fld>
             <a:endParaRPr lang="zh-TW" altLang="en-US"/>
           </a:p>
@@ -2612,7 +2620,7 @@
             <a:fld id="{E88D17E6-02BD-4944-B9FE-7BFCCBF83D48}" type="datetime1">
               <a:rPr lang="zh-TW" altLang="en-US" smtClean="0"/>
               <a:pPr/>
-              <a:t>2020/4/5</a:t>
+              <a:t>2020/6/28</a:t>
             </a:fld>
             <a:endParaRPr lang="zh-TW" altLang="en-US"/>
           </a:p>
@@ -2861,7 +2869,7 @@
             <a:fld id="{3C13E23D-1FEF-4D78-A3A3-3D6F2BB31954}" type="datetime1">
               <a:rPr lang="zh-TW" altLang="en-US" smtClean="0"/>
               <a:pPr/>
-              <a:t>2020/4/5</a:t>
+              <a:t>2020/6/28</a:t>
             </a:fld>
             <a:endParaRPr lang="zh-TW" altLang="en-US"/>
           </a:p>
@@ -3069,7 +3077,7 @@
             <a:fld id="{06197F35-AD6F-4594-8B50-334492D2E7E8}" type="datetime1">
               <a:rPr lang="zh-TW" altLang="en-US" smtClean="0"/>
               <a:pPr/>
-              <a:t>2020/4/5</a:t>
+              <a:t>2020/6/28</a:t>
             </a:fld>
             <a:endParaRPr lang="zh-TW" altLang="en-US"/>
           </a:p>
@@ -3538,7 +3546,7 @@
             <a:fld id="{C389EDC9-19E3-47AC-9C57-C6A24DEA81AD}" type="datetime1">
               <a:rPr lang="zh-TW" altLang="en-US" smtClean="0"/>
               <a:pPr/>
-              <a:t>2020/4/5</a:t>
+              <a:t>2020/6/28</a:t>
             </a:fld>
             <a:endParaRPr lang="zh-TW" altLang="en-US"/>
           </a:p>
@@ -3936,7 +3944,7 @@
             <a:fld id="{A4F910E6-8D00-4BAF-8C48-9688E0B449D3}" type="datetime1">
               <a:rPr lang="zh-TW" altLang="en-US" smtClean="0"/>
               <a:pPr/>
-              <a:t>2020/4/5</a:t>
+              <a:t>2020/6/28</a:t>
             </a:fld>
             <a:endParaRPr lang="zh-TW" altLang="en-US"/>
           </a:p>
@@ -4237,36 +4245,6 @@
       </p:sp>
       <p:sp>
         <p:nvSpPr>
-          <p:cNvPr id="3" name="副標題 2"/>
-          <p:cNvSpPr>
-            <a:spLocks noGrp="1"/>
-          </p:cNvSpPr>
-          <p:nvPr>
-            <p:ph type="subTitle" idx="1"/>
-          </p:nvPr>
-        </p:nvSpPr>
-        <p:spPr>
-          <a:xfrm>
-            <a:off x="1259632" y="4581128"/>
-            <a:ext cx="6400800" cy="694928"/>
-          </a:xfrm>
-        </p:spPr>
-        <p:txBody>
-          <a:bodyPr>
-            <a:normAutofit/>
-          </a:bodyPr>
-          <a:lstStyle/>
-          <a:p>
-            <a:r>
-              <a:rPr lang="en-US" altLang="zh-TW" dirty="0"/>
-              <a:t>Peter H. Chen</a:t>
-            </a:r>
-            <a:endParaRPr lang="zh-TW" altLang="en-US" dirty="0"/>
-          </a:p>
-        </p:txBody>
-      </p:sp>
-      <p:sp>
-        <p:nvSpPr>
           <p:cNvPr id="5" name="日期版面配置區 4"/>
           <p:cNvSpPr>
             <a:spLocks noGrp="1"/>
@@ -4283,7 +4261,7 @@
             <a:fld id="{C389EDC9-19E3-47AC-9C57-C6A24DEA81AD}" type="datetime1">
               <a:rPr lang="zh-TW" altLang="en-US" smtClean="0"/>
               <a:pPr/>
-              <a:t>2020/4/5</a:t>
+              <a:t>2020/6/28</a:t>
             </a:fld>
             <a:endParaRPr lang="zh-TW" altLang="en-US"/>
           </a:p>
@@ -4704,7 +4682,7 @@
             <a:fld id="{A4F910E6-8D00-4BAF-8C48-9688E0B449D3}" type="datetime1">
               <a:rPr lang="zh-TW" altLang="en-US" smtClean="0"/>
               <a:pPr/>
-              <a:t>2020/4/5</a:t>
+              <a:t>2020/6/28</a:t>
             </a:fld>
             <a:endParaRPr lang="zh-TW" altLang="en-US"/>
           </a:p>
@@ -5382,7 +5360,7 @@
             <a:fld id="{A4F910E6-8D00-4BAF-8C48-9688E0B449D3}" type="datetime1">
               <a:rPr lang="zh-TW" altLang="en-US" smtClean="0"/>
               <a:pPr/>
-              <a:t>2020/4/5</a:t>
+              <a:t>2020/6/28</a:t>
             </a:fld>
             <a:endParaRPr lang="zh-TW" altLang="en-US"/>
           </a:p>
@@ -5974,36 +5952,6 @@
       </p:sp>
       <p:sp>
         <p:nvSpPr>
-          <p:cNvPr id="3" name="副標題 2"/>
-          <p:cNvSpPr>
-            <a:spLocks noGrp="1"/>
-          </p:cNvSpPr>
-          <p:nvPr>
-            <p:ph type="subTitle" idx="1"/>
-          </p:nvPr>
-        </p:nvSpPr>
-        <p:spPr>
-          <a:xfrm>
-            <a:off x="1259632" y="4581128"/>
-            <a:ext cx="6400800" cy="694928"/>
-          </a:xfrm>
-        </p:spPr>
-        <p:txBody>
-          <a:bodyPr>
-            <a:normAutofit/>
-          </a:bodyPr>
-          <a:lstStyle/>
-          <a:p>
-            <a:r>
-              <a:rPr lang="en-US" altLang="zh-TW" dirty="0"/>
-              <a:t>Peter H. Chen</a:t>
-            </a:r>
-            <a:endParaRPr lang="zh-TW" altLang="en-US" dirty="0"/>
-          </a:p>
-        </p:txBody>
-      </p:sp>
-      <p:sp>
-        <p:nvSpPr>
           <p:cNvPr id="5" name="日期版面配置區 4"/>
           <p:cNvSpPr>
             <a:spLocks noGrp="1"/>
@@ -6020,7 +5968,7 @@
             <a:fld id="{C389EDC9-19E3-47AC-9C57-C6A24DEA81AD}" type="datetime1">
               <a:rPr lang="zh-TW" altLang="en-US" smtClean="0"/>
               <a:pPr/>
-              <a:t>2020/4/5</a:t>
+              <a:t>2020/6/28</a:t>
             </a:fld>
             <a:endParaRPr lang="zh-TW" altLang="en-US"/>
           </a:p>
@@ -6429,7 +6377,7 @@
             <a:fld id="{A4F910E6-8D00-4BAF-8C48-9688E0B449D3}" type="datetime1">
               <a:rPr lang="zh-TW" altLang="en-US" smtClean="0"/>
               <a:pPr/>
-              <a:t>2020/4/5</a:t>
+              <a:t>2020/6/28</a:t>
             </a:fld>
             <a:endParaRPr lang="zh-TW" altLang="en-US"/>
           </a:p>
@@ -6597,36 +6545,6 @@
       </p:sp>
       <p:sp>
         <p:nvSpPr>
-          <p:cNvPr id="3" name="副標題 2"/>
-          <p:cNvSpPr>
-            <a:spLocks noGrp="1"/>
-          </p:cNvSpPr>
-          <p:nvPr>
-            <p:ph type="subTitle" idx="1"/>
-          </p:nvPr>
-        </p:nvSpPr>
-        <p:spPr>
-          <a:xfrm>
-            <a:off x="1259632" y="4581128"/>
-            <a:ext cx="6400800" cy="694928"/>
-          </a:xfrm>
-        </p:spPr>
-        <p:txBody>
-          <a:bodyPr>
-            <a:normAutofit/>
-          </a:bodyPr>
-          <a:lstStyle/>
-          <a:p>
-            <a:r>
-              <a:rPr lang="en-US" altLang="zh-TW" dirty="0"/>
-              <a:t>Peter H. Chen</a:t>
-            </a:r>
-            <a:endParaRPr lang="zh-TW" altLang="en-US" dirty="0"/>
-          </a:p>
-        </p:txBody>
-      </p:sp>
-      <p:sp>
-        <p:nvSpPr>
           <p:cNvPr id="5" name="日期版面配置區 4"/>
           <p:cNvSpPr>
             <a:spLocks noGrp="1"/>
@@ -6643,7 +6561,7 @@
             <a:fld id="{C389EDC9-19E3-47AC-9C57-C6A24DEA81AD}" type="datetime1">
               <a:rPr lang="zh-TW" altLang="en-US" smtClean="0"/>
               <a:pPr/>
-              <a:t>2020/4/5</a:t>
+              <a:t>2020/6/28</a:t>
             </a:fld>
             <a:endParaRPr lang="zh-TW" altLang="en-US"/>
           </a:p>
@@ -7046,7 +6964,7 @@
             <a:fld id="{A4F910E6-8D00-4BAF-8C48-9688E0B449D3}" type="datetime1">
               <a:rPr lang="zh-TW" altLang="en-US" smtClean="0"/>
               <a:pPr/>
-              <a:t>2020/4/5</a:t>
+              <a:t>2020/6/28</a:t>
             </a:fld>
             <a:endParaRPr lang="zh-TW" altLang="en-US"/>
           </a:p>
@@ -7249,36 +7167,6 @@
       </p:sp>
       <p:sp>
         <p:nvSpPr>
-          <p:cNvPr id="3" name="副標題 2"/>
-          <p:cNvSpPr>
-            <a:spLocks noGrp="1"/>
-          </p:cNvSpPr>
-          <p:nvPr>
-            <p:ph type="subTitle" idx="1"/>
-          </p:nvPr>
-        </p:nvSpPr>
-        <p:spPr>
-          <a:xfrm>
-            <a:off x="1259632" y="4581128"/>
-            <a:ext cx="6400800" cy="694928"/>
-          </a:xfrm>
-        </p:spPr>
-        <p:txBody>
-          <a:bodyPr>
-            <a:normAutofit/>
-          </a:bodyPr>
-          <a:lstStyle/>
-          <a:p>
-            <a:r>
-              <a:rPr lang="en-US" altLang="zh-TW" dirty="0"/>
-              <a:t>Peter H. Chen</a:t>
-            </a:r>
-            <a:endParaRPr lang="zh-TW" altLang="en-US" dirty="0"/>
-          </a:p>
-        </p:txBody>
-      </p:sp>
-      <p:sp>
-        <p:nvSpPr>
           <p:cNvPr id="5" name="日期版面配置區 4"/>
           <p:cNvSpPr>
             <a:spLocks noGrp="1"/>
@@ -7295,7 +7183,7 @@
             <a:fld id="{C389EDC9-19E3-47AC-9C57-C6A24DEA81AD}" type="datetime1">
               <a:rPr lang="zh-TW" altLang="en-US" smtClean="0"/>
               <a:pPr/>
-              <a:t>2020/4/5</a:t>
+              <a:t>2020/6/28</a:t>
             </a:fld>
             <a:endParaRPr lang="zh-TW" altLang="en-US"/>
           </a:p>
@@ -7700,7 +7588,7 @@
             <a:fld id="{A4F910E6-8D00-4BAF-8C48-9688E0B449D3}" type="datetime1">
               <a:rPr lang="zh-TW" altLang="en-US" smtClean="0"/>
               <a:pPr/>
-              <a:t>2020/4/5</a:t>
+              <a:t>2020/6/28</a:t>
             </a:fld>
             <a:endParaRPr lang="zh-TW" altLang="en-US"/>
           </a:p>
@@ -8002,7 +7890,7 @@
             <a:fld id="{A4F910E6-8D00-4BAF-8C48-9688E0B449D3}" type="datetime1">
               <a:rPr lang="zh-TW" altLang="en-US" smtClean="0"/>
               <a:pPr/>
-              <a:t>2020/4/5</a:t>
+              <a:t>2020/6/28</a:t>
             </a:fld>
             <a:endParaRPr lang="zh-TW" altLang="en-US"/>
           </a:p>
@@ -8112,32 +8000,9 @@
             <a:off x="0" y="2130425"/>
             <a:ext cx="9144000" cy="1470025"/>
           </a:xfrm>
-          <a:gradFill flip="none" rotWithShape="1">
-            <a:gsLst>
-              <a:gs pos="0">
-                <a:srgbClr val="00B0F0">
-                  <a:shade val="30000"/>
-                  <a:satMod val="115000"/>
-                </a:srgbClr>
-              </a:gs>
-              <a:gs pos="50000">
-                <a:srgbClr val="00B0F0">
-                  <a:shade val="67500"/>
-                  <a:satMod val="115000"/>
-                </a:srgbClr>
-              </a:gs>
-              <a:gs pos="100000">
-                <a:srgbClr val="00B0F0">
-                  <a:shade val="100000"/>
-                  <a:satMod val="115000"/>
-                </a:srgbClr>
-              </a:gs>
-            </a:gsLst>
-            <a:path path="circle">
-              <a:fillToRect t="100000" r="100000"/>
-            </a:path>
-            <a:tileRect l="-100000" b="-100000"/>
-          </a:gradFill>
+          <a:solidFill>
+            <a:srgbClr val="00B0F0"/>
+          </a:solidFill>
         </p:spPr>
         <p:txBody>
           <a:bodyPr>
@@ -8146,14 +8011,14 @@
           <a:lstStyle/>
           <a:p>
             <a:r>
-              <a:rPr lang="en-US" altLang="zh-TW" sz="6000" b="1" dirty="0">
+              <a:rPr lang="en-US" altLang="zh-TW" sz="4800" b="1" dirty="0">
                 <a:solidFill>
                   <a:srgbClr val="FFFF00"/>
                 </a:solidFill>
               </a:rPr>
-              <a:t>End of Chapter</a:t>
-            </a:r>
-            <a:endParaRPr lang="zh-TW" altLang="en-US" sz="6000" b="1" dirty="0">
+              <a:t>11.6 Quiz</a:t>
+            </a:r>
+            <a:endParaRPr lang="zh-TW" altLang="en-US" sz="4800" b="1" dirty="0">
               <a:solidFill>
                 <a:srgbClr val="FFFF00"/>
               </a:solidFill>
@@ -8176,10 +8041,10 @@
           <a:bodyPr/>
           <a:lstStyle/>
           <a:p>
-            <a:fld id="{4E46BE27-E923-4EC2-B046-3272AE2A3E5C}" type="datetime1">
+            <a:fld id="{C389EDC9-19E3-47AC-9C57-C6A24DEA81AD}" type="datetime1">
               <a:rPr lang="zh-TW" altLang="en-US" smtClean="0"/>
               <a:pPr/>
-              <a:t>2020/4/5</a:t>
+              <a:t>2020/6/28</a:t>
             </a:fld>
             <a:endParaRPr lang="zh-TW" altLang="en-US"/>
           </a:p>
@@ -8209,7 +8074,44 @@
           </a:p>
         </p:txBody>
       </p:sp>
+      <p:pic>
+        <p:nvPicPr>
+          <p:cNvPr id="2050" name="Picture 2"/>
+          <p:cNvPicPr>
+            <a:picLocks noChangeAspect="1" noChangeArrowheads="1"/>
+          </p:cNvPicPr>
+          <p:nvPr/>
+        </p:nvPicPr>
+        <p:blipFill>
+          <a:blip r:embed="rId2" cstate="print"/>
+          <a:srcRect/>
+          <a:stretch>
+            <a:fillRect/>
+          </a:stretch>
+        </p:blipFill>
+        <p:spPr bwMode="auto">
+          <a:xfrm>
+            <a:off x="4283968" y="3717032"/>
+            <a:ext cx="713805" cy="644588"/>
+          </a:xfrm>
+          <a:prstGeom prst="rect">
+            <a:avLst/>
+          </a:prstGeom>
+          <a:noFill/>
+          <a:ln w="9525">
+            <a:noFill/>
+            <a:miter lim="800000"/>
+            <a:headEnd/>
+            <a:tailEnd/>
+          </a:ln>
+        </p:spPr>
+      </p:pic>
     </p:spTree>
+    <p:extLst>
+      <p:ext uri="{BB962C8B-B14F-4D97-AF65-F5344CB8AC3E}">
+        <p14:creationId xmlns:p14="http://schemas.microsoft.com/office/powerpoint/2010/main" val="3413519521"/>
+      </p:ext>
+    </p:extLst>
   </p:cSld>
   <p:clrMapOvr>
     <a:masterClrMapping/>
@@ -8217,7 +8119,7 @@
 </p:sld>
 </file>
 
-<file path=ppt/slides/slide3.xml><?xml version="1.0" encoding="utf-8"?>
+<file path=ppt/slides/slide21.xml><?xml version="1.0" encoding="utf-8"?>
 <p:sld xmlns:a="http://schemas.openxmlformats.org/drawingml/2006/main" xmlns:r="http://schemas.openxmlformats.org/officeDocument/2006/relationships" xmlns:p="http://schemas.openxmlformats.org/presentationml/2006/main">
   <p:cSld>
     <p:spTree>
@@ -8289,15 +8191,7 @@
                   <a:srgbClr val="FFFF00"/>
                 </a:solidFill>
               </a:rPr>
-              <a:t>11 </a:t>
-            </a:r>
-            <a:r>
-              <a:rPr lang="en-US" altLang="zh-TW" b="1" dirty="0" err="1">
-                <a:solidFill>
-                  <a:srgbClr val="FFFF00"/>
-                </a:solidFill>
-              </a:rPr>
-              <a:t>setState</a:t>
+              <a:t>11.6 Quiz</a:t>
             </a:r>
             <a:endParaRPr lang="zh-TW" altLang="en-US" b="1" dirty="0">
               <a:solidFill>
@@ -8319,8 +8213,8 @@
         </p:nvSpPr>
         <p:spPr>
           <a:xfrm>
-            <a:off x="467544" y="1340764"/>
-            <a:ext cx="8219256" cy="1496303"/>
+            <a:off x="467544" y="1340765"/>
+            <a:ext cx="8219256" cy="892328"/>
           </a:xfrm>
           <a:ln>
             <a:solidFill>
@@ -8349,7 +8243,7 @@
                 </a:solidFill>
                 <a:latin typeface="+mj-lt"/>
               </a:rPr>
-              <a:t>Set state in React:</a:t>
+              <a:t>Quiz:</a:t>
             </a:r>
           </a:p>
           <a:p>
@@ -8368,7 +8262,7 @@
                 </a:solidFill>
                 <a:latin typeface="+mj-lt"/>
               </a:rPr>
-              <a:t>We create a counter component in this discussion: </a:t>
+              <a:t>1. In VS Code, what is framework we need for React?</a:t>
             </a:r>
           </a:p>
           <a:p>
@@ -8387,18 +8281,17 @@
                 </a:solidFill>
                 <a:latin typeface="+mj-lt"/>
               </a:rPr>
-              <a:t>We have counter value and Create a button to increment the counter value.</a:t>
-            </a:r>
-          </a:p>
-          <a:p>
-            <a:pPr marL="342900" indent="-342900" algn="l">
-              <a:buClr>
-                <a:srgbClr val="0070C0"/>
-              </a:buClr>
-              <a:buSzPct val="80000"/>
-              <a:buFont typeface="Wingdings" pitchFamily="2" charset="2"/>
-              <a:buChar char="u"/>
-            </a:pPr>
+              <a:t>Ans: Install “ES7 React/Redux/</a:t>
+            </a:r>
+            <a:r>
+              <a:rPr lang="en-US" altLang="zh-TW" sz="1600" b="1" dirty="0" err="1">
+                <a:solidFill>
+                  <a:schemeClr val="tx1"/>
+                </a:solidFill>
+                <a:latin typeface="+mj-lt"/>
+              </a:rPr>
+              <a:t>GraphQL</a:t>
+            </a:r>
             <a:r>
               <a:rPr lang="en-US" altLang="zh-TW" sz="1600" b="1" dirty="0">
                 <a:solidFill>
@@ -8406,26 +8299,7 @@
                 </a:solidFill>
                 <a:latin typeface="+mj-lt"/>
               </a:rPr>
-              <a:t>Create Counter.js.</a:t>
-            </a:r>
-          </a:p>
-          <a:p>
-            <a:pPr marL="342900" indent="-342900" algn="l">
-              <a:buClr>
-                <a:srgbClr val="0070C0"/>
-              </a:buClr>
-              <a:buSzPct val="80000"/>
-              <a:buFont typeface="Wingdings" pitchFamily="2" charset="2"/>
-              <a:buChar char="u"/>
-            </a:pPr>
-            <a:r>
-              <a:rPr lang="en-US" altLang="zh-TW" sz="1600" b="1" dirty="0">
-                <a:solidFill>
-                  <a:schemeClr val="tx1"/>
-                </a:solidFill>
-                <a:latin typeface="+mj-lt"/>
-              </a:rPr>
-              <a:t>We are learning the state in class components. This is going to be a class component as well.</a:t>
+              <a:t>/React-Native snippets”</a:t>
             </a:r>
           </a:p>
         </p:txBody>
@@ -8512,7 +8386,4065 @@
             <a:fld id="{A4F910E6-8D00-4BAF-8C48-9688E0B449D3}" type="datetime1">
               <a:rPr lang="zh-TW" altLang="en-US" smtClean="0"/>
               <a:pPr/>
-              <a:t>2020/4/5</a:t>
+              <a:t>2020/6/28</a:t>
+            </a:fld>
+            <a:endParaRPr lang="zh-TW" altLang="en-US"/>
+          </a:p>
+        </p:txBody>
+      </p:sp>
+      <p:sp>
+        <p:nvSpPr>
+          <p:cNvPr id="6" name="投影片編號版面配置區 5"/>
+          <p:cNvSpPr>
+            <a:spLocks noGrp="1"/>
+          </p:cNvSpPr>
+          <p:nvPr>
+            <p:ph type="sldNum" sz="quarter" idx="12"/>
+          </p:nvPr>
+        </p:nvSpPr>
+        <p:spPr>
+          <a:xfrm>
+            <a:off x="6553200" y="6356350"/>
+            <a:ext cx="2133600" cy="404246"/>
+          </a:xfrm>
+        </p:spPr>
+        <p:txBody>
+          <a:bodyPr/>
+          <a:lstStyle/>
+          <a:p>
+            <a:fld id="{E4D7E63D-91F2-4366-A2C4-1B00C9E2590E}" type="slidenum">
+              <a:rPr lang="zh-TW" altLang="en-US" smtClean="0"/>
+              <a:pPr/>
+              <a:t>21</a:t>
+            </a:fld>
+            <a:endParaRPr lang="zh-TW" altLang="en-US"/>
+          </a:p>
+        </p:txBody>
+      </p:sp>
+      <p:pic>
+        <p:nvPicPr>
+          <p:cNvPr id="10" name="Picture 9">
+            <a:extLst>
+              <a:ext uri="{FF2B5EF4-FFF2-40B4-BE49-F238E27FC236}">
+                <a16:creationId xmlns:a16="http://schemas.microsoft.com/office/drawing/2014/main" id="{1488ECA7-7010-4E88-998A-72740C18E488}"/>
+              </a:ext>
+            </a:extLst>
+          </p:cNvPr>
+          <p:cNvPicPr>
+            <a:picLocks noChangeAspect="1"/>
+          </p:cNvPicPr>
+          <p:nvPr/>
+        </p:nvPicPr>
+        <p:blipFill>
+          <a:blip r:embed="rId3"/>
+          <a:stretch>
+            <a:fillRect/>
+          </a:stretch>
+        </p:blipFill>
+        <p:spPr>
+          <a:xfrm>
+            <a:off x="1169876" y="2416817"/>
+            <a:ext cx="6804248" cy="3690362"/>
+          </a:xfrm>
+          <a:prstGeom prst="rect">
+            <a:avLst/>
+          </a:prstGeom>
+          <a:ln>
+            <a:solidFill>
+              <a:srgbClr val="C00000"/>
+            </a:solidFill>
+          </a:ln>
+        </p:spPr>
+      </p:pic>
+    </p:spTree>
+    <p:extLst>
+      <p:ext uri="{BB962C8B-B14F-4D97-AF65-F5344CB8AC3E}">
+        <p14:creationId xmlns:p14="http://schemas.microsoft.com/office/powerpoint/2010/main" val="1785567959"/>
+      </p:ext>
+    </p:extLst>
+  </p:cSld>
+  <p:clrMapOvr>
+    <a:masterClrMapping/>
+  </p:clrMapOvr>
+</p:sld>
+</file>
+
+<file path=ppt/slides/slide22.xml><?xml version="1.0" encoding="utf-8"?>
+<p:sld xmlns:a="http://schemas.openxmlformats.org/drawingml/2006/main" xmlns:r="http://schemas.openxmlformats.org/officeDocument/2006/relationships" xmlns:p="http://schemas.openxmlformats.org/presentationml/2006/main">
+  <p:cSld>
+    <p:spTree>
+      <p:nvGrpSpPr>
+        <p:cNvPr id="1" name=""/>
+        <p:cNvGrpSpPr/>
+        <p:nvPr/>
+      </p:nvGrpSpPr>
+      <p:grpSpPr>
+        <a:xfrm>
+          <a:off x="0" y="0"/>
+          <a:ext cx="0" cy="0"/>
+          <a:chOff x="0" y="0"/>
+          <a:chExt cx="0" cy="0"/>
+        </a:xfrm>
+      </p:grpSpPr>
+      <p:sp>
+        <p:nvSpPr>
+          <p:cNvPr id="2" name="標題 1"/>
+          <p:cNvSpPr>
+            <a:spLocks noGrp="1"/>
+          </p:cNvSpPr>
+          <p:nvPr>
+            <p:ph type="ctrTitle"/>
+          </p:nvPr>
+        </p:nvSpPr>
+        <p:spPr>
+          <a:xfrm>
+            <a:off x="0" y="1"/>
+            <a:ext cx="9144000" cy="764704"/>
+          </a:xfrm>
+          <a:gradFill flip="none" rotWithShape="1">
+            <a:gsLst>
+              <a:gs pos="0">
+                <a:srgbClr val="C00000">
+                  <a:shade val="30000"/>
+                  <a:satMod val="115000"/>
+                </a:srgbClr>
+              </a:gs>
+              <a:gs pos="50000">
+                <a:srgbClr val="C00000">
+                  <a:shade val="67500"/>
+                  <a:satMod val="115000"/>
+                </a:srgbClr>
+              </a:gs>
+              <a:gs pos="100000">
+                <a:srgbClr val="C00000">
+                  <a:shade val="100000"/>
+                  <a:satMod val="115000"/>
+                </a:srgbClr>
+              </a:gs>
+            </a:gsLst>
+            <a:path path="circle">
+              <a:fillToRect t="100000" r="100000"/>
+            </a:path>
+            <a:tileRect l="-100000" b="-100000"/>
+          </a:gradFill>
+        </p:spPr>
+        <p:txBody>
+          <a:bodyPr>
+            <a:normAutofit/>
+          </a:bodyPr>
+          <a:lstStyle/>
+          <a:p>
+            <a:pPr algn="l"/>
+            <a:r>
+              <a:rPr lang="en-US" altLang="zh-TW" b="1" dirty="0">
+                <a:solidFill>
+                  <a:srgbClr val="FFFF00"/>
+                </a:solidFill>
+              </a:rPr>
+              <a:t>11.6 Quiz</a:t>
+            </a:r>
+            <a:endParaRPr lang="zh-TW" altLang="en-US" b="1" dirty="0">
+              <a:solidFill>
+                <a:srgbClr val="FFFF00"/>
+              </a:solidFill>
+            </a:endParaRPr>
+          </a:p>
+        </p:txBody>
+      </p:sp>
+      <p:sp>
+        <p:nvSpPr>
+          <p:cNvPr id="3" name="副標題 2"/>
+          <p:cNvSpPr>
+            <a:spLocks noGrp="1"/>
+          </p:cNvSpPr>
+          <p:nvPr>
+            <p:ph type="subTitle" idx="1"/>
+          </p:nvPr>
+        </p:nvSpPr>
+        <p:spPr>
+          <a:xfrm>
+            <a:off x="467544" y="1340764"/>
+            <a:ext cx="8219256" cy="5015585"/>
+          </a:xfrm>
+          <a:ln>
+            <a:solidFill>
+              <a:srgbClr val="C00000"/>
+            </a:solidFill>
+          </a:ln>
+        </p:spPr>
+        <p:txBody>
+          <a:bodyPr>
+            <a:noAutofit/>
+          </a:bodyPr>
+          <a:lstStyle/>
+          <a:p>
+            <a:pPr marL="342900" indent="-342900" algn="l">
+              <a:buClr>
+                <a:srgbClr val="0070C0"/>
+              </a:buClr>
+              <a:buSzPct val="80000"/>
+              <a:buFont typeface="Wingdings" pitchFamily="2" charset="2"/>
+              <a:buChar char="u"/>
+            </a:pPr>
+            <a:r>
+              <a:rPr lang="en-US" altLang="zh-TW" sz="1600" b="1" dirty="0">
+                <a:solidFill>
+                  <a:schemeClr val="tx1"/>
+                </a:solidFill>
+                <a:latin typeface="+mj-lt"/>
+              </a:rPr>
+              <a:t>Quiz:</a:t>
+            </a:r>
+          </a:p>
+          <a:p>
+            <a:pPr marL="342900" indent="-342900" algn="l">
+              <a:buClr>
+                <a:srgbClr val="0070C0"/>
+              </a:buClr>
+              <a:buSzPct val="80000"/>
+              <a:buFont typeface="Wingdings" pitchFamily="2" charset="2"/>
+              <a:buChar char="u"/>
+            </a:pPr>
+            <a:r>
+              <a:rPr lang="en-US" altLang="zh-TW" sz="1600" b="1" dirty="0">
+                <a:solidFill>
+                  <a:schemeClr val="tx1"/>
+                </a:solidFill>
+                <a:latin typeface="+mj-lt"/>
+              </a:rPr>
+              <a:t>2. In VS Code, what is command to create a React Class?</a:t>
+            </a:r>
+          </a:p>
+          <a:p>
+            <a:pPr marL="342900" indent="-342900" algn="l">
+              <a:buClr>
+                <a:srgbClr val="0070C0"/>
+              </a:buClr>
+              <a:buSzPct val="80000"/>
+              <a:buFont typeface="Wingdings" pitchFamily="2" charset="2"/>
+              <a:buChar char="u"/>
+            </a:pPr>
+            <a:r>
+              <a:rPr lang="en-US" altLang="zh-TW" sz="1600" b="1" dirty="0">
+                <a:solidFill>
+                  <a:schemeClr val="tx1"/>
+                </a:solidFill>
+                <a:latin typeface="+mj-lt"/>
+              </a:rPr>
+              <a:t>Ans: Type ‘</a:t>
+            </a:r>
+            <a:r>
+              <a:rPr lang="en-US" altLang="zh-TW" sz="1600" b="1" dirty="0" err="1">
+                <a:solidFill>
+                  <a:schemeClr val="tx1"/>
+                </a:solidFill>
+                <a:latin typeface="+mj-lt"/>
+              </a:rPr>
+              <a:t>rce</a:t>
+            </a:r>
+            <a:r>
+              <a:rPr lang="en-US" altLang="zh-TW" sz="1600" b="1" dirty="0">
+                <a:solidFill>
+                  <a:schemeClr val="tx1"/>
+                </a:solidFill>
+                <a:latin typeface="+mj-lt"/>
+              </a:rPr>
+              <a:t>’ to create a React Class. ‘</a:t>
+            </a:r>
+            <a:r>
+              <a:rPr lang="en-US" altLang="zh-TW" sz="1600" b="1" dirty="0" err="1">
+                <a:solidFill>
+                  <a:schemeClr val="tx1"/>
+                </a:solidFill>
+                <a:latin typeface="+mj-lt"/>
+              </a:rPr>
+              <a:t>rce</a:t>
+            </a:r>
+            <a:r>
+              <a:rPr lang="en-US" altLang="zh-TW" sz="1600" b="1" dirty="0">
+                <a:solidFill>
+                  <a:schemeClr val="tx1"/>
+                </a:solidFill>
+                <a:latin typeface="+mj-lt"/>
+              </a:rPr>
+              <a:t>’ stands for ‘React Class Component with EC7’.</a:t>
+            </a:r>
+          </a:p>
+          <a:p>
+            <a:pPr marL="342900" indent="-342900" algn="l">
+              <a:buClr>
+                <a:srgbClr val="0070C0"/>
+              </a:buClr>
+              <a:buSzPct val="80000"/>
+              <a:buFont typeface="Wingdings" pitchFamily="2" charset="2"/>
+              <a:buChar char="u"/>
+            </a:pPr>
+            <a:r>
+              <a:rPr lang="en-US" altLang="zh-TW" sz="1600" b="1" dirty="0">
+                <a:solidFill>
+                  <a:schemeClr val="tx1"/>
+                </a:solidFill>
+                <a:latin typeface="+mj-lt"/>
+              </a:rPr>
+              <a:t>3. Give a file name Counter.js, what is ‘</a:t>
+            </a:r>
+            <a:r>
+              <a:rPr lang="en-US" altLang="zh-TW" sz="1600" b="1" dirty="0" err="1">
+                <a:solidFill>
+                  <a:schemeClr val="tx1"/>
+                </a:solidFill>
+                <a:latin typeface="+mj-lt"/>
+              </a:rPr>
+              <a:t>rce</a:t>
+            </a:r>
+            <a:r>
+              <a:rPr lang="en-US" altLang="zh-TW" sz="1600" b="1" dirty="0">
+                <a:solidFill>
+                  <a:schemeClr val="tx1"/>
+                </a:solidFill>
+                <a:latin typeface="+mj-lt"/>
+              </a:rPr>
+              <a:t>’ code generated for you?</a:t>
+            </a:r>
+          </a:p>
+          <a:p>
+            <a:pPr marL="342900" indent="-342900" algn="l">
+              <a:buClr>
+                <a:srgbClr val="0070C0"/>
+              </a:buClr>
+              <a:buSzPct val="80000"/>
+              <a:buFont typeface="Wingdings" pitchFamily="2" charset="2"/>
+              <a:buChar char="u"/>
+            </a:pPr>
+            <a:r>
+              <a:rPr lang="en-US" altLang="zh-TW" sz="1600" b="1" dirty="0">
+                <a:solidFill>
+                  <a:schemeClr val="tx1"/>
+                </a:solidFill>
+                <a:latin typeface="+mj-lt"/>
+              </a:rPr>
+              <a:t>Ans:</a:t>
+            </a:r>
+          </a:p>
+          <a:p>
+            <a:pPr marL="342900" indent="-342900" algn="l">
+              <a:buClr>
+                <a:srgbClr val="0070C0"/>
+              </a:buClr>
+              <a:buSzPct val="80000"/>
+              <a:buFont typeface="Wingdings" pitchFamily="2" charset="2"/>
+              <a:buChar char="u"/>
+            </a:pPr>
+            <a:r>
+              <a:rPr lang="en-US" altLang="zh-TW" sz="1600" b="1" dirty="0">
+                <a:solidFill>
+                  <a:schemeClr val="tx1"/>
+                </a:solidFill>
+                <a:latin typeface="+mj-lt"/>
+              </a:rPr>
+              <a:t>&gt; import React, { Component } from ‘react’</a:t>
+            </a:r>
+          </a:p>
+          <a:p>
+            <a:pPr marL="342900" indent="-342900" algn="l">
+              <a:buClr>
+                <a:srgbClr val="0070C0"/>
+              </a:buClr>
+              <a:buSzPct val="80000"/>
+              <a:buFont typeface="Wingdings" pitchFamily="2" charset="2"/>
+              <a:buChar char="u"/>
+            </a:pPr>
+            <a:r>
+              <a:rPr lang="en-US" altLang="zh-TW" sz="1600" b="1" dirty="0">
+                <a:solidFill>
+                  <a:schemeClr val="tx1"/>
+                </a:solidFill>
+                <a:latin typeface="+mj-lt"/>
+              </a:rPr>
+              <a:t>&gt; </a:t>
+            </a:r>
+            <a:r>
+              <a:rPr lang="en-US" altLang="zh-TW" sz="1600" b="1" strike="sngStrike" dirty="0">
+                <a:solidFill>
+                  <a:srgbClr val="C00000"/>
+                </a:solidFill>
+                <a:latin typeface="+mj-lt"/>
+              </a:rPr>
+              <a:t>export</a:t>
+            </a:r>
+            <a:r>
+              <a:rPr lang="en-US" altLang="zh-TW" sz="1600" b="1" dirty="0">
+                <a:solidFill>
+                  <a:schemeClr val="tx1"/>
+                </a:solidFill>
+                <a:latin typeface="+mj-lt"/>
+              </a:rPr>
+              <a:t> class Counter extends Component {</a:t>
+            </a:r>
+          </a:p>
+          <a:p>
+            <a:pPr marL="342900" indent="-342900" algn="l">
+              <a:buClr>
+                <a:srgbClr val="0070C0"/>
+              </a:buClr>
+              <a:buSzPct val="80000"/>
+              <a:buFont typeface="Wingdings" pitchFamily="2" charset="2"/>
+              <a:buChar char="u"/>
+            </a:pPr>
+            <a:r>
+              <a:rPr lang="en-US" altLang="zh-TW" sz="1600" b="1" dirty="0">
+                <a:solidFill>
+                  <a:schemeClr val="tx1"/>
+                </a:solidFill>
+                <a:latin typeface="+mj-lt"/>
+              </a:rPr>
+              <a:t>&gt;    render {</a:t>
+            </a:r>
+          </a:p>
+          <a:p>
+            <a:pPr marL="342900" indent="-342900" algn="l">
+              <a:buClr>
+                <a:srgbClr val="0070C0"/>
+              </a:buClr>
+              <a:buSzPct val="80000"/>
+              <a:buFont typeface="Wingdings" pitchFamily="2" charset="2"/>
+              <a:buChar char="u"/>
+            </a:pPr>
+            <a:r>
+              <a:rPr lang="en-US" altLang="zh-TW" sz="1600" b="1" dirty="0">
+                <a:solidFill>
+                  <a:schemeClr val="tx1"/>
+                </a:solidFill>
+                <a:latin typeface="+mj-lt"/>
+              </a:rPr>
+              <a:t>&gt;        return (</a:t>
+            </a:r>
+          </a:p>
+          <a:p>
+            <a:pPr marL="342900" indent="-342900" algn="l">
+              <a:buClr>
+                <a:srgbClr val="0070C0"/>
+              </a:buClr>
+              <a:buSzPct val="80000"/>
+              <a:buFont typeface="Wingdings" pitchFamily="2" charset="2"/>
+              <a:buChar char="u"/>
+            </a:pPr>
+            <a:r>
+              <a:rPr lang="en-US" altLang="zh-TW" sz="1600" b="1" dirty="0">
+                <a:solidFill>
+                  <a:schemeClr val="tx1"/>
+                </a:solidFill>
+                <a:latin typeface="+mj-lt"/>
+              </a:rPr>
+              <a:t>&gt;             &lt;div&gt;</a:t>
+            </a:r>
+          </a:p>
+          <a:p>
+            <a:pPr marL="342900" indent="-342900" algn="l">
+              <a:buClr>
+                <a:srgbClr val="0070C0"/>
+              </a:buClr>
+              <a:buSzPct val="80000"/>
+              <a:buFont typeface="Wingdings" pitchFamily="2" charset="2"/>
+              <a:buChar char="u"/>
+            </a:pPr>
+            <a:r>
+              <a:rPr lang="en-US" altLang="zh-TW" sz="1600" b="1" dirty="0">
+                <a:solidFill>
+                  <a:schemeClr val="tx1"/>
+                </a:solidFill>
+                <a:latin typeface="+mj-lt"/>
+              </a:rPr>
+              <a:t>&gt;             </a:t>
+            </a:r>
+          </a:p>
+          <a:p>
+            <a:pPr marL="342900" indent="-342900" algn="l">
+              <a:buClr>
+                <a:srgbClr val="0070C0"/>
+              </a:buClr>
+              <a:buSzPct val="80000"/>
+              <a:buFont typeface="Wingdings" pitchFamily="2" charset="2"/>
+              <a:buChar char="u"/>
+            </a:pPr>
+            <a:r>
+              <a:rPr lang="en-US" altLang="zh-TW" sz="1600" b="1" dirty="0">
+                <a:solidFill>
+                  <a:schemeClr val="tx1"/>
+                </a:solidFill>
+                <a:latin typeface="+mj-lt"/>
+              </a:rPr>
+              <a:t>&gt;             &lt;/div&gt;</a:t>
+            </a:r>
+          </a:p>
+          <a:p>
+            <a:pPr marL="342900" indent="-342900" algn="l">
+              <a:buClr>
+                <a:srgbClr val="0070C0"/>
+              </a:buClr>
+              <a:buSzPct val="80000"/>
+              <a:buFont typeface="Wingdings" pitchFamily="2" charset="2"/>
+              <a:buChar char="u"/>
+            </a:pPr>
+            <a:r>
+              <a:rPr lang="en-US" altLang="zh-TW" sz="1600" b="1" dirty="0">
+                <a:solidFill>
+                  <a:schemeClr val="tx1"/>
+                </a:solidFill>
+                <a:latin typeface="+mj-lt"/>
+              </a:rPr>
+              <a:t>&gt;        )</a:t>
+            </a:r>
+          </a:p>
+          <a:p>
+            <a:pPr marL="342900" indent="-342900" algn="l">
+              <a:buClr>
+                <a:srgbClr val="0070C0"/>
+              </a:buClr>
+              <a:buSzPct val="80000"/>
+              <a:buFont typeface="Wingdings" pitchFamily="2" charset="2"/>
+              <a:buChar char="u"/>
+            </a:pPr>
+            <a:r>
+              <a:rPr lang="en-US" altLang="zh-TW" sz="1600" b="1" dirty="0">
+                <a:solidFill>
+                  <a:schemeClr val="tx1"/>
+                </a:solidFill>
+                <a:latin typeface="+mj-lt"/>
+              </a:rPr>
+              <a:t>&gt;    }</a:t>
+            </a:r>
+          </a:p>
+          <a:p>
+            <a:pPr marL="342900" indent="-342900" algn="l">
+              <a:buClr>
+                <a:srgbClr val="0070C0"/>
+              </a:buClr>
+              <a:buSzPct val="80000"/>
+              <a:buFont typeface="Wingdings" pitchFamily="2" charset="2"/>
+              <a:buChar char="u"/>
+            </a:pPr>
+            <a:r>
+              <a:rPr lang="en-US" altLang="zh-TW" sz="1600" b="1" dirty="0">
+                <a:solidFill>
+                  <a:schemeClr val="tx1"/>
+                </a:solidFill>
+                <a:latin typeface="+mj-lt"/>
+              </a:rPr>
+              <a:t>&gt; }</a:t>
+            </a:r>
+          </a:p>
+          <a:p>
+            <a:pPr marL="342900" indent="-342900" algn="l">
+              <a:buClr>
+                <a:srgbClr val="0070C0"/>
+              </a:buClr>
+              <a:buSzPct val="80000"/>
+              <a:buFont typeface="Wingdings" pitchFamily="2" charset="2"/>
+              <a:buChar char="u"/>
+            </a:pPr>
+            <a:r>
+              <a:rPr lang="en-US" altLang="zh-TW" sz="1600" b="1" dirty="0">
+                <a:solidFill>
+                  <a:schemeClr val="tx1"/>
+                </a:solidFill>
+                <a:latin typeface="+mj-lt"/>
+              </a:rPr>
+              <a:t>&gt; export default Counter </a:t>
+            </a:r>
+          </a:p>
+          <a:p>
+            <a:pPr marL="342900" indent="-342900" algn="l">
+              <a:buClr>
+                <a:srgbClr val="0070C0"/>
+              </a:buClr>
+              <a:buSzPct val="80000"/>
+              <a:buFont typeface="Wingdings" pitchFamily="2" charset="2"/>
+              <a:buChar char="u"/>
+            </a:pPr>
+            <a:r>
+              <a:rPr lang="en-US" altLang="zh-TW" sz="1600" b="1" dirty="0">
+                <a:solidFill>
+                  <a:schemeClr val="tx1"/>
+                </a:solidFill>
+                <a:latin typeface="+mj-lt"/>
+              </a:rPr>
+              <a:t>Cross out ‘export’ in front of class Counter.</a:t>
+            </a:r>
+          </a:p>
+        </p:txBody>
+      </p:sp>
+      <p:sp>
+        <p:nvSpPr>
+          <p:cNvPr id="4" name="標題 1"/>
+          <p:cNvSpPr txBox="1">
+            <a:spLocks/>
+          </p:cNvSpPr>
+          <p:nvPr/>
+        </p:nvSpPr>
+        <p:spPr>
+          <a:xfrm>
+            <a:off x="0" y="764704"/>
+            <a:ext cx="9144000" cy="398616"/>
+          </a:xfrm>
+          <a:prstGeom prst="rect">
+            <a:avLst/>
+          </a:prstGeom>
+          <a:gradFill flip="none" rotWithShape="1">
+            <a:gsLst>
+              <a:gs pos="0">
+                <a:srgbClr val="00B0F0">
+                  <a:shade val="30000"/>
+                  <a:satMod val="115000"/>
+                </a:srgbClr>
+              </a:gs>
+              <a:gs pos="50000">
+                <a:srgbClr val="00B0F0">
+                  <a:shade val="67500"/>
+                  <a:satMod val="115000"/>
+                </a:srgbClr>
+              </a:gs>
+              <a:gs pos="100000">
+                <a:srgbClr val="00B0F0">
+                  <a:shade val="100000"/>
+                  <a:satMod val="115000"/>
+                </a:srgbClr>
+              </a:gs>
+            </a:gsLst>
+            <a:path path="circle">
+              <a:fillToRect t="100000" r="100000"/>
+            </a:path>
+            <a:tileRect l="-100000" b="-100000"/>
+          </a:gradFill>
+        </p:spPr>
+        <p:txBody>
+          <a:bodyPr vert="horz" lIns="91440" tIns="45720" rIns="91440" bIns="45720" rtlCol="0" anchor="ctr">
+            <a:normAutofit/>
+          </a:bodyPr>
+          <a:lstStyle/>
+          <a:p>
+            <a:r>
+              <a:rPr lang="en-US" sz="1600" dirty="0">
+                <a:hlinkClick r:id="rId2"/>
+              </a:rPr>
+              <a:t>https://www.youtube.com/watch?v=uirRaVjRsf4&amp;list=PLC3y8-rFHvwgg3vaYJgHGnModB54rxOk3&amp;index=11</a:t>
+            </a:r>
+            <a:endParaRPr lang="en-US" altLang="zh-TW" sz="1600" b="1" i="1" dirty="0"/>
+          </a:p>
+        </p:txBody>
+      </p:sp>
+      <p:sp>
+        <p:nvSpPr>
+          <p:cNvPr id="5" name="日期版面配置區 4"/>
+          <p:cNvSpPr>
+            <a:spLocks noGrp="1"/>
+          </p:cNvSpPr>
+          <p:nvPr>
+            <p:ph type="dt" sz="half" idx="10"/>
+          </p:nvPr>
+        </p:nvSpPr>
+        <p:spPr>
+          <a:xfrm>
+            <a:off x="457200" y="6356350"/>
+            <a:ext cx="2133600" cy="404246"/>
+          </a:xfrm>
+        </p:spPr>
+        <p:txBody>
+          <a:bodyPr/>
+          <a:lstStyle/>
+          <a:p>
+            <a:fld id="{A4F910E6-8D00-4BAF-8C48-9688E0B449D3}" type="datetime1">
+              <a:rPr lang="zh-TW" altLang="en-US" smtClean="0"/>
+              <a:pPr/>
+              <a:t>2020/6/28</a:t>
+            </a:fld>
+            <a:endParaRPr lang="zh-TW" altLang="en-US"/>
+          </a:p>
+        </p:txBody>
+      </p:sp>
+      <p:sp>
+        <p:nvSpPr>
+          <p:cNvPr id="6" name="投影片編號版面配置區 5"/>
+          <p:cNvSpPr>
+            <a:spLocks noGrp="1"/>
+          </p:cNvSpPr>
+          <p:nvPr>
+            <p:ph type="sldNum" sz="quarter" idx="12"/>
+          </p:nvPr>
+        </p:nvSpPr>
+        <p:spPr>
+          <a:xfrm>
+            <a:off x="6553200" y="6356350"/>
+            <a:ext cx="2133600" cy="404246"/>
+          </a:xfrm>
+        </p:spPr>
+        <p:txBody>
+          <a:bodyPr/>
+          <a:lstStyle/>
+          <a:p>
+            <a:fld id="{E4D7E63D-91F2-4366-A2C4-1B00C9E2590E}" type="slidenum">
+              <a:rPr lang="zh-TW" altLang="en-US" smtClean="0"/>
+              <a:pPr/>
+              <a:t>22</a:t>
+            </a:fld>
+            <a:endParaRPr lang="zh-TW" altLang="en-US"/>
+          </a:p>
+        </p:txBody>
+      </p:sp>
+    </p:spTree>
+    <p:extLst>
+      <p:ext uri="{BB962C8B-B14F-4D97-AF65-F5344CB8AC3E}">
+        <p14:creationId xmlns:p14="http://schemas.microsoft.com/office/powerpoint/2010/main" val="1402070241"/>
+      </p:ext>
+    </p:extLst>
+  </p:cSld>
+  <p:clrMapOvr>
+    <a:masterClrMapping/>
+  </p:clrMapOvr>
+</p:sld>
+</file>
+
+<file path=ppt/slides/slide23.xml><?xml version="1.0" encoding="utf-8"?>
+<p:sld xmlns:a="http://schemas.openxmlformats.org/drawingml/2006/main" xmlns:r="http://schemas.openxmlformats.org/officeDocument/2006/relationships" xmlns:p="http://schemas.openxmlformats.org/presentationml/2006/main">
+  <p:cSld>
+    <p:spTree>
+      <p:nvGrpSpPr>
+        <p:cNvPr id="1" name=""/>
+        <p:cNvGrpSpPr/>
+        <p:nvPr/>
+      </p:nvGrpSpPr>
+      <p:grpSpPr>
+        <a:xfrm>
+          <a:off x="0" y="0"/>
+          <a:ext cx="0" cy="0"/>
+          <a:chOff x="0" y="0"/>
+          <a:chExt cx="0" cy="0"/>
+        </a:xfrm>
+      </p:grpSpPr>
+      <p:sp>
+        <p:nvSpPr>
+          <p:cNvPr id="2" name="標題 1"/>
+          <p:cNvSpPr>
+            <a:spLocks noGrp="1"/>
+          </p:cNvSpPr>
+          <p:nvPr>
+            <p:ph type="ctrTitle"/>
+          </p:nvPr>
+        </p:nvSpPr>
+        <p:spPr>
+          <a:xfrm>
+            <a:off x="0" y="1"/>
+            <a:ext cx="9144000" cy="764704"/>
+          </a:xfrm>
+          <a:gradFill flip="none" rotWithShape="1">
+            <a:gsLst>
+              <a:gs pos="0">
+                <a:srgbClr val="C00000">
+                  <a:shade val="30000"/>
+                  <a:satMod val="115000"/>
+                </a:srgbClr>
+              </a:gs>
+              <a:gs pos="50000">
+                <a:srgbClr val="C00000">
+                  <a:shade val="67500"/>
+                  <a:satMod val="115000"/>
+                </a:srgbClr>
+              </a:gs>
+              <a:gs pos="100000">
+                <a:srgbClr val="C00000">
+                  <a:shade val="100000"/>
+                  <a:satMod val="115000"/>
+                </a:srgbClr>
+              </a:gs>
+            </a:gsLst>
+            <a:path path="circle">
+              <a:fillToRect t="100000" r="100000"/>
+            </a:path>
+            <a:tileRect l="-100000" b="-100000"/>
+          </a:gradFill>
+        </p:spPr>
+        <p:txBody>
+          <a:bodyPr>
+            <a:normAutofit/>
+          </a:bodyPr>
+          <a:lstStyle/>
+          <a:p>
+            <a:pPr algn="l"/>
+            <a:r>
+              <a:rPr lang="en-US" altLang="zh-TW" b="1" dirty="0">
+                <a:solidFill>
+                  <a:srgbClr val="FFFF00"/>
+                </a:solidFill>
+              </a:rPr>
+              <a:t>11.6 Quiz</a:t>
+            </a:r>
+            <a:endParaRPr lang="zh-TW" altLang="en-US" b="1" dirty="0">
+              <a:solidFill>
+                <a:srgbClr val="FFFF00"/>
+              </a:solidFill>
+            </a:endParaRPr>
+          </a:p>
+        </p:txBody>
+      </p:sp>
+      <p:sp>
+        <p:nvSpPr>
+          <p:cNvPr id="3" name="副標題 2"/>
+          <p:cNvSpPr>
+            <a:spLocks noGrp="1"/>
+          </p:cNvSpPr>
+          <p:nvPr>
+            <p:ph type="subTitle" idx="1"/>
+          </p:nvPr>
+        </p:nvSpPr>
+        <p:spPr>
+          <a:xfrm>
+            <a:off x="467544" y="1340764"/>
+            <a:ext cx="8219256" cy="3528395"/>
+          </a:xfrm>
+          <a:ln>
+            <a:solidFill>
+              <a:srgbClr val="C00000"/>
+            </a:solidFill>
+          </a:ln>
+        </p:spPr>
+        <p:txBody>
+          <a:bodyPr>
+            <a:noAutofit/>
+          </a:bodyPr>
+          <a:lstStyle/>
+          <a:p>
+            <a:pPr marL="342900" indent="-342900" algn="l">
+              <a:buClr>
+                <a:srgbClr val="0070C0"/>
+              </a:buClr>
+              <a:buSzPct val="80000"/>
+              <a:buFont typeface="Wingdings" pitchFamily="2" charset="2"/>
+              <a:buChar char="u"/>
+            </a:pPr>
+            <a:r>
+              <a:rPr lang="en-US" altLang="zh-TW" sz="1600" b="1" dirty="0">
+                <a:solidFill>
+                  <a:schemeClr val="tx1"/>
+                </a:solidFill>
+                <a:latin typeface="+mj-lt"/>
+              </a:rPr>
+              <a:t>Quiz:</a:t>
+            </a:r>
+          </a:p>
+          <a:p>
+            <a:pPr marL="342900" indent="-342900" algn="l">
+              <a:buClr>
+                <a:srgbClr val="0070C0"/>
+              </a:buClr>
+              <a:buSzPct val="80000"/>
+              <a:buFont typeface="Wingdings" pitchFamily="2" charset="2"/>
+              <a:buChar char="u"/>
+            </a:pPr>
+            <a:r>
+              <a:rPr lang="en-US" altLang="zh-TW" sz="1600" b="1" dirty="0">
+                <a:solidFill>
+                  <a:schemeClr val="tx1"/>
+                </a:solidFill>
+                <a:latin typeface="+mj-lt"/>
+              </a:rPr>
+              <a:t>4. In VS Code, what is command to create a React Class?</a:t>
+            </a:r>
+          </a:p>
+          <a:p>
+            <a:pPr marL="342900" indent="-342900" algn="l">
+              <a:buClr>
+                <a:srgbClr val="0070C0"/>
+              </a:buClr>
+              <a:buSzPct val="80000"/>
+              <a:buFont typeface="Wingdings" pitchFamily="2" charset="2"/>
+              <a:buChar char="u"/>
+            </a:pPr>
+            <a:r>
+              <a:rPr lang="en-US" altLang="zh-TW" sz="1600" b="1" dirty="0">
+                <a:solidFill>
+                  <a:schemeClr val="tx1"/>
+                </a:solidFill>
+                <a:latin typeface="+mj-lt"/>
+              </a:rPr>
+              <a:t>Ans: Type ‘</a:t>
+            </a:r>
+            <a:r>
+              <a:rPr lang="en-US" altLang="zh-TW" sz="1600" b="1" dirty="0" err="1">
+                <a:solidFill>
+                  <a:schemeClr val="tx1"/>
+                </a:solidFill>
+                <a:latin typeface="+mj-lt"/>
+              </a:rPr>
+              <a:t>rconst</a:t>
+            </a:r>
+            <a:r>
+              <a:rPr lang="en-US" altLang="zh-TW" sz="1600" b="1" dirty="0">
+                <a:solidFill>
+                  <a:schemeClr val="tx1"/>
+                </a:solidFill>
+                <a:latin typeface="+mj-lt"/>
+              </a:rPr>
+              <a:t>’ to create a React Class. ‘</a:t>
+            </a:r>
+            <a:r>
+              <a:rPr lang="en-US" altLang="zh-TW" sz="1600" b="1" dirty="0" err="1">
+                <a:solidFill>
+                  <a:schemeClr val="tx1"/>
+                </a:solidFill>
+                <a:latin typeface="+mj-lt"/>
+              </a:rPr>
+              <a:t>rconst</a:t>
+            </a:r>
+            <a:r>
+              <a:rPr lang="en-US" altLang="zh-TW" sz="1600" b="1" dirty="0">
+                <a:solidFill>
+                  <a:schemeClr val="tx1"/>
+                </a:solidFill>
+                <a:latin typeface="+mj-lt"/>
+              </a:rPr>
+              <a:t>’ stands for ‘React constructor’.</a:t>
+            </a:r>
+          </a:p>
+          <a:p>
+            <a:pPr marL="342900" indent="-342900" algn="l">
+              <a:buClr>
+                <a:srgbClr val="0070C0"/>
+              </a:buClr>
+              <a:buSzPct val="80000"/>
+              <a:buFont typeface="Wingdings" pitchFamily="2" charset="2"/>
+              <a:buChar char="u"/>
+            </a:pPr>
+            <a:r>
+              <a:rPr lang="en-US" altLang="zh-TW" sz="1600" b="1" dirty="0">
+                <a:solidFill>
+                  <a:schemeClr val="tx1"/>
+                </a:solidFill>
+                <a:latin typeface="+mj-lt"/>
+              </a:rPr>
+              <a:t>5. What is ‘</a:t>
+            </a:r>
+            <a:r>
+              <a:rPr lang="en-US" altLang="zh-TW" sz="1600" b="1" dirty="0" err="1">
+                <a:solidFill>
+                  <a:schemeClr val="tx1"/>
+                </a:solidFill>
+                <a:latin typeface="+mj-lt"/>
+              </a:rPr>
+              <a:t>rconst</a:t>
+            </a:r>
+            <a:r>
+              <a:rPr lang="en-US" altLang="zh-TW" sz="1600" b="1" dirty="0">
+                <a:solidFill>
+                  <a:schemeClr val="tx1"/>
+                </a:solidFill>
+                <a:latin typeface="+mj-lt"/>
+              </a:rPr>
+              <a:t>’ code generated?</a:t>
+            </a:r>
+          </a:p>
+          <a:p>
+            <a:pPr marL="342900" indent="-342900" algn="l">
+              <a:buClr>
+                <a:srgbClr val="0070C0"/>
+              </a:buClr>
+              <a:buSzPct val="80000"/>
+              <a:buFont typeface="Wingdings" pitchFamily="2" charset="2"/>
+              <a:buChar char="u"/>
+            </a:pPr>
+            <a:r>
+              <a:rPr lang="en-US" altLang="zh-TW" sz="1600" b="1" dirty="0">
+                <a:solidFill>
+                  <a:schemeClr val="tx1"/>
+                </a:solidFill>
+                <a:latin typeface="+mj-lt"/>
+              </a:rPr>
+              <a:t>Ans:</a:t>
+            </a:r>
+          </a:p>
+          <a:p>
+            <a:pPr marL="342900" indent="-342900" algn="l">
+              <a:buClr>
+                <a:srgbClr val="0070C0"/>
+              </a:buClr>
+              <a:buSzPct val="80000"/>
+              <a:buFont typeface="Wingdings" pitchFamily="2" charset="2"/>
+              <a:buChar char="u"/>
+            </a:pPr>
+            <a:r>
+              <a:rPr lang="en-US" altLang="zh-TW" sz="1600" b="1" dirty="0">
+                <a:solidFill>
+                  <a:schemeClr val="tx1"/>
+                </a:solidFill>
+                <a:latin typeface="+mj-lt"/>
+              </a:rPr>
+              <a:t>In class</a:t>
+            </a:r>
+          </a:p>
+          <a:p>
+            <a:pPr marL="342900" indent="-342900" algn="l">
+              <a:buClr>
+                <a:srgbClr val="0070C0"/>
+              </a:buClr>
+              <a:buSzPct val="80000"/>
+              <a:buFont typeface="Wingdings" pitchFamily="2" charset="2"/>
+              <a:buChar char="u"/>
+            </a:pPr>
+            <a:r>
+              <a:rPr lang="en-US" altLang="zh-TW" sz="1600" b="1" dirty="0">
+                <a:solidFill>
+                  <a:schemeClr val="tx1"/>
+                </a:solidFill>
+                <a:latin typeface="+mj-lt"/>
+              </a:rPr>
+              <a:t>&gt; constructor (props) {</a:t>
+            </a:r>
+          </a:p>
+          <a:p>
+            <a:pPr marL="342900" indent="-342900" algn="l">
+              <a:buClr>
+                <a:srgbClr val="0070C0"/>
+              </a:buClr>
+              <a:buSzPct val="80000"/>
+              <a:buFont typeface="Wingdings" pitchFamily="2" charset="2"/>
+              <a:buChar char="u"/>
+            </a:pPr>
+            <a:r>
+              <a:rPr lang="en-US" altLang="zh-TW" sz="1600" b="1" dirty="0">
+                <a:solidFill>
+                  <a:schemeClr val="tx1"/>
+                </a:solidFill>
+                <a:latin typeface="+mj-lt"/>
+              </a:rPr>
+              <a:t>&gt;    super (props) </a:t>
+            </a:r>
+          </a:p>
+          <a:p>
+            <a:pPr marL="342900" indent="-342900" algn="l">
+              <a:buClr>
+                <a:srgbClr val="0070C0"/>
+              </a:buClr>
+              <a:buSzPct val="80000"/>
+              <a:buFont typeface="Wingdings" pitchFamily="2" charset="2"/>
+              <a:buChar char="u"/>
+            </a:pPr>
+            <a:r>
+              <a:rPr lang="en-US" altLang="zh-TW" sz="1600" b="1" dirty="0">
+                <a:solidFill>
+                  <a:schemeClr val="tx1"/>
+                </a:solidFill>
+                <a:latin typeface="+mj-lt"/>
+              </a:rPr>
+              <a:t>&gt;    </a:t>
+            </a:r>
+            <a:r>
+              <a:rPr lang="en-US" altLang="zh-TW" sz="1600" b="1" dirty="0" err="1">
+                <a:solidFill>
+                  <a:schemeClr val="tx1"/>
+                </a:solidFill>
+                <a:latin typeface="+mj-lt"/>
+              </a:rPr>
+              <a:t>this.state</a:t>
+            </a:r>
+            <a:r>
+              <a:rPr lang="en-US" altLang="zh-TW" sz="1600" b="1" dirty="0">
+                <a:solidFill>
+                  <a:schemeClr val="tx1"/>
+                </a:solidFill>
+                <a:latin typeface="+mj-lt"/>
+              </a:rPr>
+              <a:t> = {</a:t>
+            </a:r>
+          </a:p>
+          <a:p>
+            <a:pPr marL="342900" indent="-342900" algn="l">
+              <a:buClr>
+                <a:srgbClr val="0070C0"/>
+              </a:buClr>
+              <a:buSzPct val="80000"/>
+              <a:buFont typeface="Wingdings" pitchFamily="2" charset="2"/>
+              <a:buChar char="u"/>
+            </a:pPr>
+            <a:r>
+              <a:rPr lang="en-US" altLang="zh-TW" sz="1600" b="1" dirty="0">
+                <a:solidFill>
+                  <a:schemeClr val="tx1"/>
+                </a:solidFill>
+                <a:latin typeface="+mj-lt"/>
+              </a:rPr>
+              <a:t>&gt;    </a:t>
+            </a:r>
+          </a:p>
+          <a:p>
+            <a:pPr marL="342900" indent="-342900" algn="l">
+              <a:buClr>
+                <a:srgbClr val="0070C0"/>
+              </a:buClr>
+              <a:buSzPct val="80000"/>
+              <a:buFont typeface="Wingdings" pitchFamily="2" charset="2"/>
+              <a:buChar char="u"/>
+            </a:pPr>
+            <a:r>
+              <a:rPr lang="en-US" altLang="zh-TW" sz="1600" b="1" dirty="0">
+                <a:solidFill>
+                  <a:schemeClr val="tx1"/>
+                </a:solidFill>
+                <a:latin typeface="+mj-lt"/>
+              </a:rPr>
+              <a:t>&gt;    }</a:t>
+            </a:r>
+          </a:p>
+          <a:p>
+            <a:pPr marL="342900" indent="-342900" algn="l">
+              <a:buClr>
+                <a:srgbClr val="0070C0"/>
+              </a:buClr>
+              <a:buSzPct val="80000"/>
+              <a:buFont typeface="Wingdings" pitchFamily="2" charset="2"/>
+              <a:buChar char="u"/>
+            </a:pPr>
+            <a:r>
+              <a:rPr lang="en-US" altLang="zh-TW" sz="1600" b="1" dirty="0">
+                <a:solidFill>
+                  <a:schemeClr val="tx1"/>
+                </a:solidFill>
+                <a:latin typeface="+mj-lt"/>
+              </a:rPr>
+              <a:t>&gt;}</a:t>
+            </a:r>
+          </a:p>
+        </p:txBody>
+      </p:sp>
+      <p:sp>
+        <p:nvSpPr>
+          <p:cNvPr id="4" name="標題 1"/>
+          <p:cNvSpPr txBox="1">
+            <a:spLocks/>
+          </p:cNvSpPr>
+          <p:nvPr/>
+        </p:nvSpPr>
+        <p:spPr>
+          <a:xfrm>
+            <a:off x="0" y="764704"/>
+            <a:ext cx="9144000" cy="398616"/>
+          </a:xfrm>
+          <a:prstGeom prst="rect">
+            <a:avLst/>
+          </a:prstGeom>
+          <a:gradFill flip="none" rotWithShape="1">
+            <a:gsLst>
+              <a:gs pos="0">
+                <a:srgbClr val="00B0F0">
+                  <a:shade val="30000"/>
+                  <a:satMod val="115000"/>
+                </a:srgbClr>
+              </a:gs>
+              <a:gs pos="50000">
+                <a:srgbClr val="00B0F0">
+                  <a:shade val="67500"/>
+                  <a:satMod val="115000"/>
+                </a:srgbClr>
+              </a:gs>
+              <a:gs pos="100000">
+                <a:srgbClr val="00B0F0">
+                  <a:shade val="100000"/>
+                  <a:satMod val="115000"/>
+                </a:srgbClr>
+              </a:gs>
+            </a:gsLst>
+            <a:path path="circle">
+              <a:fillToRect t="100000" r="100000"/>
+            </a:path>
+            <a:tileRect l="-100000" b="-100000"/>
+          </a:gradFill>
+        </p:spPr>
+        <p:txBody>
+          <a:bodyPr vert="horz" lIns="91440" tIns="45720" rIns="91440" bIns="45720" rtlCol="0" anchor="ctr">
+            <a:normAutofit/>
+          </a:bodyPr>
+          <a:lstStyle/>
+          <a:p>
+            <a:r>
+              <a:rPr lang="en-US" sz="1600" dirty="0">
+                <a:hlinkClick r:id="rId2"/>
+              </a:rPr>
+              <a:t>https://www.youtube.com/watch?v=uirRaVjRsf4&amp;list=PLC3y8-rFHvwgg3vaYJgHGnModB54rxOk3&amp;index=11</a:t>
+            </a:r>
+            <a:endParaRPr lang="en-US" altLang="zh-TW" sz="1600" b="1" i="1" dirty="0"/>
+          </a:p>
+        </p:txBody>
+      </p:sp>
+      <p:sp>
+        <p:nvSpPr>
+          <p:cNvPr id="5" name="日期版面配置區 4"/>
+          <p:cNvSpPr>
+            <a:spLocks noGrp="1"/>
+          </p:cNvSpPr>
+          <p:nvPr>
+            <p:ph type="dt" sz="half" idx="10"/>
+          </p:nvPr>
+        </p:nvSpPr>
+        <p:spPr>
+          <a:xfrm>
+            <a:off x="457200" y="6356350"/>
+            <a:ext cx="2133600" cy="404246"/>
+          </a:xfrm>
+        </p:spPr>
+        <p:txBody>
+          <a:bodyPr/>
+          <a:lstStyle/>
+          <a:p>
+            <a:fld id="{A4F910E6-8D00-4BAF-8C48-9688E0B449D3}" type="datetime1">
+              <a:rPr lang="zh-TW" altLang="en-US" smtClean="0"/>
+              <a:pPr/>
+              <a:t>2020/6/28</a:t>
+            </a:fld>
+            <a:endParaRPr lang="zh-TW" altLang="en-US"/>
+          </a:p>
+        </p:txBody>
+      </p:sp>
+      <p:sp>
+        <p:nvSpPr>
+          <p:cNvPr id="6" name="投影片編號版面配置區 5"/>
+          <p:cNvSpPr>
+            <a:spLocks noGrp="1"/>
+          </p:cNvSpPr>
+          <p:nvPr>
+            <p:ph type="sldNum" sz="quarter" idx="12"/>
+          </p:nvPr>
+        </p:nvSpPr>
+        <p:spPr>
+          <a:xfrm>
+            <a:off x="6553200" y="6356350"/>
+            <a:ext cx="2133600" cy="404246"/>
+          </a:xfrm>
+        </p:spPr>
+        <p:txBody>
+          <a:bodyPr/>
+          <a:lstStyle/>
+          <a:p>
+            <a:fld id="{E4D7E63D-91F2-4366-A2C4-1B00C9E2590E}" type="slidenum">
+              <a:rPr lang="zh-TW" altLang="en-US" smtClean="0"/>
+              <a:pPr/>
+              <a:t>23</a:t>
+            </a:fld>
+            <a:endParaRPr lang="zh-TW" altLang="en-US"/>
+          </a:p>
+        </p:txBody>
+      </p:sp>
+    </p:spTree>
+    <p:extLst>
+      <p:ext uri="{BB962C8B-B14F-4D97-AF65-F5344CB8AC3E}">
+        <p14:creationId xmlns:p14="http://schemas.microsoft.com/office/powerpoint/2010/main" val="2000246453"/>
+      </p:ext>
+    </p:extLst>
+  </p:cSld>
+  <p:clrMapOvr>
+    <a:masterClrMapping/>
+  </p:clrMapOvr>
+</p:sld>
+</file>
+
+<file path=ppt/slides/slide24.xml><?xml version="1.0" encoding="utf-8"?>
+<p:sld xmlns:a="http://schemas.openxmlformats.org/drawingml/2006/main" xmlns:r="http://schemas.openxmlformats.org/officeDocument/2006/relationships" xmlns:p="http://schemas.openxmlformats.org/presentationml/2006/main">
+  <p:cSld>
+    <p:spTree>
+      <p:nvGrpSpPr>
+        <p:cNvPr id="1" name=""/>
+        <p:cNvGrpSpPr/>
+        <p:nvPr/>
+      </p:nvGrpSpPr>
+      <p:grpSpPr>
+        <a:xfrm>
+          <a:off x="0" y="0"/>
+          <a:ext cx="0" cy="0"/>
+          <a:chOff x="0" y="0"/>
+          <a:chExt cx="0" cy="0"/>
+        </a:xfrm>
+      </p:grpSpPr>
+      <p:sp>
+        <p:nvSpPr>
+          <p:cNvPr id="2" name="標題 1"/>
+          <p:cNvSpPr>
+            <a:spLocks noGrp="1"/>
+          </p:cNvSpPr>
+          <p:nvPr>
+            <p:ph type="ctrTitle"/>
+          </p:nvPr>
+        </p:nvSpPr>
+        <p:spPr>
+          <a:xfrm>
+            <a:off x="0" y="1"/>
+            <a:ext cx="9144000" cy="764704"/>
+          </a:xfrm>
+          <a:gradFill flip="none" rotWithShape="1">
+            <a:gsLst>
+              <a:gs pos="0">
+                <a:srgbClr val="C00000">
+                  <a:shade val="30000"/>
+                  <a:satMod val="115000"/>
+                </a:srgbClr>
+              </a:gs>
+              <a:gs pos="50000">
+                <a:srgbClr val="C00000">
+                  <a:shade val="67500"/>
+                  <a:satMod val="115000"/>
+                </a:srgbClr>
+              </a:gs>
+              <a:gs pos="100000">
+                <a:srgbClr val="C00000">
+                  <a:shade val="100000"/>
+                  <a:satMod val="115000"/>
+                </a:srgbClr>
+              </a:gs>
+            </a:gsLst>
+            <a:path path="circle">
+              <a:fillToRect t="100000" r="100000"/>
+            </a:path>
+            <a:tileRect l="-100000" b="-100000"/>
+          </a:gradFill>
+        </p:spPr>
+        <p:txBody>
+          <a:bodyPr>
+            <a:normAutofit/>
+          </a:bodyPr>
+          <a:lstStyle/>
+          <a:p>
+            <a:pPr algn="l"/>
+            <a:r>
+              <a:rPr lang="en-US" altLang="zh-TW" b="1" dirty="0">
+                <a:solidFill>
+                  <a:srgbClr val="FFFF00"/>
+                </a:solidFill>
+              </a:rPr>
+              <a:t>11.6 Quiz</a:t>
+            </a:r>
+            <a:endParaRPr lang="zh-TW" altLang="en-US" b="1" dirty="0">
+              <a:solidFill>
+                <a:srgbClr val="FFFF00"/>
+              </a:solidFill>
+            </a:endParaRPr>
+          </a:p>
+        </p:txBody>
+      </p:sp>
+      <p:sp>
+        <p:nvSpPr>
+          <p:cNvPr id="3" name="副標題 2"/>
+          <p:cNvSpPr>
+            <a:spLocks noGrp="1"/>
+          </p:cNvSpPr>
+          <p:nvPr>
+            <p:ph type="subTitle" idx="1"/>
+          </p:nvPr>
+        </p:nvSpPr>
+        <p:spPr>
+          <a:xfrm>
+            <a:off x="467544" y="1340765"/>
+            <a:ext cx="8219256" cy="2664299"/>
+          </a:xfrm>
+          <a:ln>
+            <a:solidFill>
+              <a:srgbClr val="C00000"/>
+            </a:solidFill>
+          </a:ln>
+        </p:spPr>
+        <p:txBody>
+          <a:bodyPr>
+            <a:noAutofit/>
+          </a:bodyPr>
+          <a:lstStyle/>
+          <a:p>
+            <a:pPr marL="342900" indent="-342900" algn="l">
+              <a:buClr>
+                <a:srgbClr val="0070C0"/>
+              </a:buClr>
+              <a:buSzPct val="80000"/>
+              <a:buFont typeface="Wingdings" pitchFamily="2" charset="2"/>
+              <a:buChar char="u"/>
+            </a:pPr>
+            <a:r>
+              <a:rPr lang="en-US" altLang="zh-TW" sz="1600" b="1" dirty="0">
+                <a:solidFill>
+                  <a:schemeClr val="tx1"/>
+                </a:solidFill>
+                <a:latin typeface="+mj-lt"/>
+              </a:rPr>
+              <a:t>Quiz:</a:t>
+            </a:r>
+          </a:p>
+          <a:p>
+            <a:pPr marL="342900" indent="-342900" algn="l">
+              <a:buClr>
+                <a:srgbClr val="0070C0"/>
+              </a:buClr>
+              <a:buSzPct val="80000"/>
+              <a:buFont typeface="Wingdings" pitchFamily="2" charset="2"/>
+              <a:buChar char="u"/>
+            </a:pPr>
+            <a:r>
+              <a:rPr lang="en-US" altLang="zh-TW" sz="1600" b="1" dirty="0">
+                <a:solidFill>
+                  <a:schemeClr val="tx1"/>
+                </a:solidFill>
+                <a:latin typeface="+mj-lt"/>
+              </a:rPr>
+              <a:t>6. How to initialize 0 to the count in </a:t>
+            </a:r>
+            <a:r>
+              <a:rPr lang="en-US" altLang="zh-TW" sz="1600" b="1" dirty="0" err="1">
+                <a:solidFill>
+                  <a:schemeClr val="tx1"/>
+                </a:solidFill>
+                <a:latin typeface="+mj-lt"/>
+              </a:rPr>
+              <a:t>this.state</a:t>
+            </a:r>
+            <a:r>
+              <a:rPr lang="en-US" altLang="zh-TW" sz="1600" b="1" dirty="0">
+                <a:solidFill>
+                  <a:schemeClr val="tx1"/>
+                </a:solidFill>
+                <a:latin typeface="+mj-lt"/>
+              </a:rPr>
+              <a:t>?</a:t>
+            </a:r>
+          </a:p>
+          <a:p>
+            <a:pPr marL="342900" indent="-342900" algn="l">
+              <a:buClr>
+                <a:srgbClr val="0070C0"/>
+              </a:buClr>
+              <a:buSzPct val="80000"/>
+              <a:buFont typeface="Wingdings" pitchFamily="2" charset="2"/>
+              <a:buChar char="u"/>
+            </a:pPr>
+            <a:r>
+              <a:rPr lang="en-US" altLang="zh-TW" sz="1600" b="1" dirty="0">
+                <a:solidFill>
+                  <a:schemeClr val="tx1"/>
+                </a:solidFill>
+                <a:latin typeface="+mj-lt"/>
+              </a:rPr>
+              <a:t>Ans:</a:t>
+            </a:r>
+          </a:p>
+          <a:p>
+            <a:pPr marL="342900" indent="-342900" algn="l">
+              <a:buClr>
+                <a:srgbClr val="0070C0"/>
+              </a:buClr>
+              <a:buSzPct val="80000"/>
+              <a:buFont typeface="Wingdings" pitchFamily="2" charset="2"/>
+              <a:buChar char="u"/>
+            </a:pPr>
+            <a:r>
+              <a:rPr lang="en-US" altLang="zh-TW" sz="1600" b="1" dirty="0">
+                <a:solidFill>
+                  <a:schemeClr val="tx1"/>
+                </a:solidFill>
+                <a:latin typeface="+mj-lt"/>
+              </a:rPr>
+              <a:t>&gt; constructor (props) {</a:t>
+            </a:r>
+          </a:p>
+          <a:p>
+            <a:pPr marL="342900" indent="-342900" algn="l">
+              <a:buClr>
+                <a:srgbClr val="0070C0"/>
+              </a:buClr>
+              <a:buSzPct val="80000"/>
+              <a:buFont typeface="Wingdings" pitchFamily="2" charset="2"/>
+              <a:buChar char="u"/>
+            </a:pPr>
+            <a:r>
+              <a:rPr lang="en-US" altLang="zh-TW" sz="1600" b="1" dirty="0">
+                <a:solidFill>
+                  <a:schemeClr val="tx1"/>
+                </a:solidFill>
+                <a:latin typeface="+mj-lt"/>
+              </a:rPr>
+              <a:t>&gt;    super (props) </a:t>
+            </a:r>
+          </a:p>
+          <a:p>
+            <a:pPr marL="342900" indent="-342900" algn="l">
+              <a:buClr>
+                <a:srgbClr val="0070C0"/>
+              </a:buClr>
+              <a:buSzPct val="80000"/>
+              <a:buFont typeface="Wingdings" pitchFamily="2" charset="2"/>
+              <a:buChar char="u"/>
+            </a:pPr>
+            <a:r>
+              <a:rPr lang="en-US" altLang="zh-TW" sz="1600" b="1" dirty="0">
+                <a:solidFill>
+                  <a:schemeClr val="tx1"/>
+                </a:solidFill>
+                <a:latin typeface="+mj-lt"/>
+              </a:rPr>
+              <a:t>&gt;    </a:t>
+            </a:r>
+            <a:r>
+              <a:rPr lang="en-US" altLang="zh-TW" sz="1600" b="1" dirty="0" err="1">
+                <a:solidFill>
+                  <a:schemeClr val="tx1"/>
+                </a:solidFill>
+                <a:latin typeface="+mj-lt"/>
+              </a:rPr>
+              <a:t>this.state</a:t>
+            </a:r>
+            <a:r>
+              <a:rPr lang="en-US" altLang="zh-TW" sz="1600" b="1" dirty="0">
+                <a:solidFill>
+                  <a:schemeClr val="tx1"/>
+                </a:solidFill>
+                <a:latin typeface="+mj-lt"/>
+              </a:rPr>
+              <a:t> = {</a:t>
+            </a:r>
+          </a:p>
+          <a:p>
+            <a:pPr marL="342900" indent="-342900" algn="l">
+              <a:buClr>
+                <a:srgbClr val="0070C0"/>
+              </a:buClr>
+              <a:buSzPct val="80000"/>
+              <a:buFont typeface="Wingdings" pitchFamily="2" charset="2"/>
+              <a:buChar char="u"/>
+            </a:pPr>
+            <a:r>
+              <a:rPr lang="en-US" altLang="zh-TW" sz="1600" b="1" dirty="0">
+                <a:solidFill>
+                  <a:schemeClr val="tx1"/>
+                </a:solidFill>
+                <a:latin typeface="+mj-lt"/>
+              </a:rPr>
+              <a:t>&gt;        count: 0</a:t>
+            </a:r>
+          </a:p>
+          <a:p>
+            <a:pPr marL="342900" indent="-342900" algn="l">
+              <a:buClr>
+                <a:srgbClr val="0070C0"/>
+              </a:buClr>
+              <a:buSzPct val="80000"/>
+              <a:buFont typeface="Wingdings" pitchFamily="2" charset="2"/>
+              <a:buChar char="u"/>
+            </a:pPr>
+            <a:r>
+              <a:rPr lang="en-US" altLang="zh-TW" sz="1600" b="1" dirty="0">
+                <a:solidFill>
+                  <a:schemeClr val="tx1"/>
+                </a:solidFill>
+                <a:latin typeface="+mj-lt"/>
+              </a:rPr>
+              <a:t>&gt;    }</a:t>
+            </a:r>
+          </a:p>
+          <a:p>
+            <a:pPr marL="342900" indent="-342900" algn="l">
+              <a:buClr>
+                <a:srgbClr val="0070C0"/>
+              </a:buClr>
+              <a:buSzPct val="80000"/>
+              <a:buFont typeface="Wingdings" pitchFamily="2" charset="2"/>
+              <a:buChar char="u"/>
+            </a:pPr>
+            <a:r>
+              <a:rPr lang="en-US" altLang="zh-TW" sz="1600" b="1" dirty="0">
+                <a:solidFill>
+                  <a:schemeClr val="tx1"/>
+                </a:solidFill>
+                <a:latin typeface="+mj-lt"/>
+              </a:rPr>
+              <a:t>&gt;}</a:t>
+            </a:r>
+          </a:p>
+        </p:txBody>
+      </p:sp>
+      <p:sp>
+        <p:nvSpPr>
+          <p:cNvPr id="4" name="標題 1"/>
+          <p:cNvSpPr txBox="1">
+            <a:spLocks/>
+          </p:cNvSpPr>
+          <p:nvPr/>
+        </p:nvSpPr>
+        <p:spPr>
+          <a:xfrm>
+            <a:off x="0" y="764704"/>
+            <a:ext cx="9144000" cy="398616"/>
+          </a:xfrm>
+          <a:prstGeom prst="rect">
+            <a:avLst/>
+          </a:prstGeom>
+          <a:gradFill flip="none" rotWithShape="1">
+            <a:gsLst>
+              <a:gs pos="0">
+                <a:srgbClr val="00B0F0">
+                  <a:shade val="30000"/>
+                  <a:satMod val="115000"/>
+                </a:srgbClr>
+              </a:gs>
+              <a:gs pos="50000">
+                <a:srgbClr val="00B0F0">
+                  <a:shade val="67500"/>
+                  <a:satMod val="115000"/>
+                </a:srgbClr>
+              </a:gs>
+              <a:gs pos="100000">
+                <a:srgbClr val="00B0F0">
+                  <a:shade val="100000"/>
+                  <a:satMod val="115000"/>
+                </a:srgbClr>
+              </a:gs>
+            </a:gsLst>
+            <a:path path="circle">
+              <a:fillToRect t="100000" r="100000"/>
+            </a:path>
+            <a:tileRect l="-100000" b="-100000"/>
+          </a:gradFill>
+        </p:spPr>
+        <p:txBody>
+          <a:bodyPr vert="horz" lIns="91440" tIns="45720" rIns="91440" bIns="45720" rtlCol="0" anchor="ctr">
+            <a:normAutofit/>
+          </a:bodyPr>
+          <a:lstStyle/>
+          <a:p>
+            <a:r>
+              <a:rPr lang="en-US" sz="1600" dirty="0">
+                <a:hlinkClick r:id="rId2"/>
+              </a:rPr>
+              <a:t>https://www.youtube.com/watch?v=uirRaVjRsf4&amp;list=PLC3y8-rFHvwgg3vaYJgHGnModB54rxOk3&amp;index=11</a:t>
+            </a:r>
+            <a:endParaRPr lang="en-US" altLang="zh-TW" sz="1600" b="1" i="1" dirty="0"/>
+          </a:p>
+        </p:txBody>
+      </p:sp>
+      <p:sp>
+        <p:nvSpPr>
+          <p:cNvPr id="5" name="日期版面配置區 4"/>
+          <p:cNvSpPr>
+            <a:spLocks noGrp="1"/>
+          </p:cNvSpPr>
+          <p:nvPr>
+            <p:ph type="dt" sz="half" idx="10"/>
+          </p:nvPr>
+        </p:nvSpPr>
+        <p:spPr>
+          <a:xfrm>
+            <a:off x="457200" y="6356350"/>
+            <a:ext cx="2133600" cy="404246"/>
+          </a:xfrm>
+        </p:spPr>
+        <p:txBody>
+          <a:bodyPr/>
+          <a:lstStyle/>
+          <a:p>
+            <a:fld id="{A4F910E6-8D00-4BAF-8C48-9688E0B449D3}" type="datetime1">
+              <a:rPr lang="zh-TW" altLang="en-US" smtClean="0"/>
+              <a:pPr/>
+              <a:t>2020/6/28</a:t>
+            </a:fld>
+            <a:endParaRPr lang="zh-TW" altLang="en-US"/>
+          </a:p>
+        </p:txBody>
+      </p:sp>
+      <p:sp>
+        <p:nvSpPr>
+          <p:cNvPr id="6" name="投影片編號版面配置區 5"/>
+          <p:cNvSpPr>
+            <a:spLocks noGrp="1"/>
+          </p:cNvSpPr>
+          <p:nvPr>
+            <p:ph type="sldNum" sz="quarter" idx="12"/>
+          </p:nvPr>
+        </p:nvSpPr>
+        <p:spPr>
+          <a:xfrm>
+            <a:off x="6553200" y="6356350"/>
+            <a:ext cx="2133600" cy="404246"/>
+          </a:xfrm>
+        </p:spPr>
+        <p:txBody>
+          <a:bodyPr/>
+          <a:lstStyle/>
+          <a:p>
+            <a:fld id="{E4D7E63D-91F2-4366-A2C4-1B00C9E2590E}" type="slidenum">
+              <a:rPr lang="zh-TW" altLang="en-US" smtClean="0"/>
+              <a:pPr/>
+              <a:t>24</a:t>
+            </a:fld>
+            <a:endParaRPr lang="zh-TW" altLang="en-US"/>
+          </a:p>
+        </p:txBody>
+      </p:sp>
+    </p:spTree>
+    <p:extLst>
+      <p:ext uri="{BB962C8B-B14F-4D97-AF65-F5344CB8AC3E}">
+        <p14:creationId xmlns:p14="http://schemas.microsoft.com/office/powerpoint/2010/main" val="3359766626"/>
+      </p:ext>
+    </p:extLst>
+  </p:cSld>
+  <p:clrMapOvr>
+    <a:masterClrMapping/>
+  </p:clrMapOvr>
+</p:sld>
+</file>
+
+<file path=ppt/slides/slide25.xml><?xml version="1.0" encoding="utf-8"?>
+<p:sld xmlns:a="http://schemas.openxmlformats.org/drawingml/2006/main" xmlns:r="http://schemas.openxmlformats.org/officeDocument/2006/relationships" xmlns:p="http://schemas.openxmlformats.org/presentationml/2006/main">
+  <p:cSld>
+    <p:spTree>
+      <p:nvGrpSpPr>
+        <p:cNvPr id="1" name=""/>
+        <p:cNvGrpSpPr/>
+        <p:nvPr/>
+      </p:nvGrpSpPr>
+      <p:grpSpPr>
+        <a:xfrm>
+          <a:off x="0" y="0"/>
+          <a:ext cx="0" cy="0"/>
+          <a:chOff x="0" y="0"/>
+          <a:chExt cx="0" cy="0"/>
+        </a:xfrm>
+      </p:grpSpPr>
+      <p:sp>
+        <p:nvSpPr>
+          <p:cNvPr id="2" name="標題 1"/>
+          <p:cNvSpPr>
+            <a:spLocks noGrp="1"/>
+          </p:cNvSpPr>
+          <p:nvPr>
+            <p:ph type="ctrTitle"/>
+          </p:nvPr>
+        </p:nvSpPr>
+        <p:spPr>
+          <a:xfrm>
+            <a:off x="0" y="1"/>
+            <a:ext cx="9144000" cy="764704"/>
+          </a:xfrm>
+          <a:gradFill flip="none" rotWithShape="1">
+            <a:gsLst>
+              <a:gs pos="0">
+                <a:srgbClr val="C00000">
+                  <a:shade val="30000"/>
+                  <a:satMod val="115000"/>
+                </a:srgbClr>
+              </a:gs>
+              <a:gs pos="50000">
+                <a:srgbClr val="C00000">
+                  <a:shade val="67500"/>
+                  <a:satMod val="115000"/>
+                </a:srgbClr>
+              </a:gs>
+              <a:gs pos="100000">
+                <a:srgbClr val="C00000">
+                  <a:shade val="100000"/>
+                  <a:satMod val="115000"/>
+                </a:srgbClr>
+              </a:gs>
+            </a:gsLst>
+            <a:path path="circle">
+              <a:fillToRect t="100000" r="100000"/>
+            </a:path>
+            <a:tileRect l="-100000" b="-100000"/>
+          </a:gradFill>
+        </p:spPr>
+        <p:txBody>
+          <a:bodyPr>
+            <a:normAutofit/>
+          </a:bodyPr>
+          <a:lstStyle/>
+          <a:p>
+            <a:pPr algn="l"/>
+            <a:r>
+              <a:rPr lang="en-US" altLang="zh-TW" b="1" dirty="0">
+                <a:solidFill>
+                  <a:srgbClr val="FFFF00"/>
+                </a:solidFill>
+              </a:rPr>
+              <a:t>11.6 Quiz</a:t>
+            </a:r>
+            <a:endParaRPr lang="zh-TW" altLang="en-US" b="1" dirty="0">
+              <a:solidFill>
+                <a:srgbClr val="FFFF00"/>
+              </a:solidFill>
+            </a:endParaRPr>
+          </a:p>
+        </p:txBody>
+      </p:sp>
+      <p:sp>
+        <p:nvSpPr>
+          <p:cNvPr id="3" name="副標題 2"/>
+          <p:cNvSpPr>
+            <a:spLocks noGrp="1"/>
+          </p:cNvSpPr>
+          <p:nvPr>
+            <p:ph type="subTitle" idx="1"/>
+          </p:nvPr>
+        </p:nvSpPr>
+        <p:spPr>
+          <a:xfrm>
+            <a:off x="467544" y="1340765"/>
+            <a:ext cx="8064896" cy="2664299"/>
+          </a:xfrm>
+          <a:ln>
+            <a:solidFill>
+              <a:srgbClr val="C00000"/>
+            </a:solidFill>
+          </a:ln>
+        </p:spPr>
+        <p:txBody>
+          <a:bodyPr>
+            <a:noAutofit/>
+          </a:bodyPr>
+          <a:lstStyle/>
+          <a:p>
+            <a:pPr marL="342900" indent="-342900" algn="l">
+              <a:buClr>
+                <a:srgbClr val="0070C0"/>
+              </a:buClr>
+              <a:buSzPct val="80000"/>
+              <a:buFont typeface="Wingdings" pitchFamily="2" charset="2"/>
+              <a:buChar char="u"/>
+            </a:pPr>
+            <a:r>
+              <a:rPr lang="en-US" altLang="zh-TW" sz="1600" b="1" dirty="0">
+                <a:solidFill>
+                  <a:schemeClr val="tx1"/>
+                </a:solidFill>
+                <a:latin typeface="+mj-lt"/>
+              </a:rPr>
+              <a:t>Quiz:</a:t>
+            </a:r>
+          </a:p>
+          <a:p>
+            <a:pPr marL="342900" indent="-342900" algn="l">
+              <a:buClr>
+                <a:srgbClr val="0070C0"/>
+              </a:buClr>
+              <a:buSzPct val="80000"/>
+              <a:buFont typeface="Wingdings" pitchFamily="2" charset="2"/>
+              <a:buChar char="u"/>
+            </a:pPr>
+            <a:r>
+              <a:rPr lang="en-US" altLang="zh-TW" sz="1600" b="1" dirty="0">
+                <a:solidFill>
+                  <a:schemeClr val="tx1"/>
+                </a:solidFill>
+                <a:latin typeface="+mj-lt"/>
+              </a:rPr>
+              <a:t>7. How to display the count of </a:t>
+            </a:r>
+            <a:r>
+              <a:rPr lang="en-US" altLang="zh-TW" sz="1600" b="1" dirty="0" err="1">
+                <a:solidFill>
+                  <a:schemeClr val="tx1"/>
+                </a:solidFill>
+                <a:latin typeface="+mj-lt"/>
+              </a:rPr>
+              <a:t>this.state</a:t>
+            </a:r>
+            <a:r>
+              <a:rPr lang="en-US" altLang="zh-TW" sz="1600" b="1" dirty="0">
+                <a:solidFill>
+                  <a:schemeClr val="tx1"/>
+                </a:solidFill>
+                <a:latin typeface="+mj-lt"/>
+              </a:rPr>
+              <a:t>?</a:t>
+            </a:r>
+          </a:p>
+          <a:p>
+            <a:pPr marL="342900" indent="-342900" algn="l">
+              <a:buClr>
+                <a:srgbClr val="0070C0"/>
+              </a:buClr>
+              <a:buSzPct val="80000"/>
+              <a:buFont typeface="Wingdings" pitchFamily="2" charset="2"/>
+              <a:buChar char="u"/>
+            </a:pPr>
+            <a:r>
+              <a:rPr lang="en-US" altLang="zh-TW" sz="1600" b="1" dirty="0">
+                <a:solidFill>
+                  <a:schemeClr val="tx1"/>
+                </a:solidFill>
+                <a:latin typeface="+mj-lt"/>
+              </a:rPr>
+              <a:t>Ans:</a:t>
+            </a:r>
+          </a:p>
+          <a:p>
+            <a:pPr marL="342900" indent="-342900" algn="l">
+              <a:buClr>
+                <a:srgbClr val="0070C0"/>
+              </a:buClr>
+              <a:buSzPct val="80000"/>
+              <a:buFont typeface="Wingdings" pitchFamily="2" charset="2"/>
+              <a:buChar char="u"/>
+            </a:pPr>
+            <a:r>
+              <a:rPr lang="en-US" altLang="zh-TW" sz="1600" b="1" dirty="0">
+                <a:solidFill>
+                  <a:schemeClr val="tx1"/>
+                </a:solidFill>
+                <a:latin typeface="+mj-lt"/>
+              </a:rPr>
+              <a:t>&gt; class … {</a:t>
+            </a:r>
+          </a:p>
+          <a:p>
+            <a:pPr marL="342900" indent="-342900" algn="l">
+              <a:buClr>
+                <a:srgbClr val="0070C0"/>
+              </a:buClr>
+              <a:buSzPct val="80000"/>
+              <a:buFont typeface="Wingdings" pitchFamily="2" charset="2"/>
+              <a:buChar char="u"/>
+            </a:pPr>
+            <a:r>
+              <a:rPr lang="en-US" altLang="zh-TW" sz="1600" b="1" dirty="0">
+                <a:solidFill>
+                  <a:schemeClr val="tx1"/>
+                </a:solidFill>
+                <a:latin typeface="+mj-lt"/>
+              </a:rPr>
+              <a:t>&gt;    render () {</a:t>
+            </a:r>
+          </a:p>
+          <a:p>
+            <a:pPr marL="342900" indent="-342900" algn="l">
+              <a:buClr>
+                <a:srgbClr val="0070C0"/>
+              </a:buClr>
+              <a:buSzPct val="80000"/>
+              <a:buFont typeface="Wingdings" pitchFamily="2" charset="2"/>
+              <a:buChar char="u"/>
+            </a:pPr>
+            <a:r>
+              <a:rPr lang="en-US" altLang="zh-TW" sz="1600" b="1" dirty="0">
+                <a:solidFill>
+                  <a:schemeClr val="tx1"/>
+                </a:solidFill>
+                <a:latin typeface="+mj-lt"/>
+              </a:rPr>
+              <a:t>&gt;       return (&lt;div&gt; { </a:t>
+            </a:r>
+            <a:r>
+              <a:rPr lang="en-US" altLang="zh-TW" sz="1600" b="1" dirty="0" err="1">
+                <a:solidFill>
+                  <a:schemeClr val="tx1"/>
+                </a:solidFill>
+                <a:latin typeface="+mj-lt"/>
+              </a:rPr>
+              <a:t>this.state.count</a:t>
+            </a:r>
+            <a:r>
+              <a:rPr lang="en-US" altLang="zh-TW" sz="1600" b="1" dirty="0">
+                <a:solidFill>
+                  <a:schemeClr val="tx1"/>
+                </a:solidFill>
+                <a:latin typeface="+mj-lt"/>
+              </a:rPr>
+              <a:t> } &lt;/div&gt;)</a:t>
+            </a:r>
+          </a:p>
+          <a:p>
+            <a:pPr marL="342900" indent="-342900" algn="l">
+              <a:buClr>
+                <a:srgbClr val="0070C0"/>
+              </a:buClr>
+              <a:buSzPct val="80000"/>
+              <a:buFont typeface="Wingdings" pitchFamily="2" charset="2"/>
+              <a:buChar char="u"/>
+            </a:pPr>
+            <a:r>
+              <a:rPr lang="en-US" altLang="zh-TW" sz="1600" b="1" dirty="0">
+                <a:solidFill>
+                  <a:schemeClr val="tx1"/>
+                </a:solidFill>
+                <a:latin typeface="+mj-lt"/>
+              </a:rPr>
+              <a:t>&gt;    }</a:t>
+            </a:r>
+          </a:p>
+          <a:p>
+            <a:pPr marL="342900" indent="-342900" algn="l">
+              <a:buClr>
+                <a:srgbClr val="0070C0"/>
+              </a:buClr>
+              <a:buSzPct val="80000"/>
+              <a:buFont typeface="Wingdings" pitchFamily="2" charset="2"/>
+              <a:buChar char="u"/>
+            </a:pPr>
+            <a:r>
+              <a:rPr lang="en-US" altLang="zh-TW" sz="1600" b="1" dirty="0">
+                <a:solidFill>
+                  <a:schemeClr val="tx1"/>
+                </a:solidFill>
+                <a:latin typeface="+mj-lt"/>
+              </a:rPr>
+              <a:t>&gt;}</a:t>
+            </a:r>
+          </a:p>
+        </p:txBody>
+      </p:sp>
+      <p:sp>
+        <p:nvSpPr>
+          <p:cNvPr id="4" name="標題 1"/>
+          <p:cNvSpPr txBox="1">
+            <a:spLocks/>
+          </p:cNvSpPr>
+          <p:nvPr/>
+        </p:nvSpPr>
+        <p:spPr>
+          <a:xfrm>
+            <a:off x="0" y="764704"/>
+            <a:ext cx="9144000" cy="398616"/>
+          </a:xfrm>
+          <a:prstGeom prst="rect">
+            <a:avLst/>
+          </a:prstGeom>
+          <a:gradFill flip="none" rotWithShape="1">
+            <a:gsLst>
+              <a:gs pos="0">
+                <a:srgbClr val="00B0F0">
+                  <a:shade val="30000"/>
+                  <a:satMod val="115000"/>
+                </a:srgbClr>
+              </a:gs>
+              <a:gs pos="50000">
+                <a:srgbClr val="00B0F0">
+                  <a:shade val="67500"/>
+                  <a:satMod val="115000"/>
+                </a:srgbClr>
+              </a:gs>
+              <a:gs pos="100000">
+                <a:srgbClr val="00B0F0">
+                  <a:shade val="100000"/>
+                  <a:satMod val="115000"/>
+                </a:srgbClr>
+              </a:gs>
+            </a:gsLst>
+            <a:path path="circle">
+              <a:fillToRect t="100000" r="100000"/>
+            </a:path>
+            <a:tileRect l="-100000" b="-100000"/>
+          </a:gradFill>
+        </p:spPr>
+        <p:txBody>
+          <a:bodyPr vert="horz" lIns="91440" tIns="45720" rIns="91440" bIns="45720" rtlCol="0" anchor="ctr">
+            <a:normAutofit/>
+          </a:bodyPr>
+          <a:lstStyle/>
+          <a:p>
+            <a:r>
+              <a:rPr lang="en-US" sz="1600" dirty="0">
+                <a:hlinkClick r:id="rId2"/>
+              </a:rPr>
+              <a:t>https://www.youtube.com/watch?v=uirRaVjRsf4&amp;list=PLC3y8-rFHvwgg3vaYJgHGnModB54rxOk3&amp;index=11</a:t>
+            </a:r>
+            <a:endParaRPr lang="en-US" altLang="zh-TW" sz="1600" b="1" i="1" dirty="0"/>
+          </a:p>
+        </p:txBody>
+      </p:sp>
+      <p:sp>
+        <p:nvSpPr>
+          <p:cNvPr id="5" name="日期版面配置區 4"/>
+          <p:cNvSpPr>
+            <a:spLocks noGrp="1"/>
+          </p:cNvSpPr>
+          <p:nvPr>
+            <p:ph type="dt" sz="half" idx="10"/>
+          </p:nvPr>
+        </p:nvSpPr>
+        <p:spPr>
+          <a:xfrm>
+            <a:off x="457200" y="6356350"/>
+            <a:ext cx="2133600" cy="404246"/>
+          </a:xfrm>
+        </p:spPr>
+        <p:txBody>
+          <a:bodyPr/>
+          <a:lstStyle/>
+          <a:p>
+            <a:fld id="{A4F910E6-8D00-4BAF-8C48-9688E0B449D3}" type="datetime1">
+              <a:rPr lang="zh-TW" altLang="en-US" smtClean="0"/>
+              <a:pPr/>
+              <a:t>2020/6/28</a:t>
+            </a:fld>
+            <a:endParaRPr lang="zh-TW" altLang="en-US"/>
+          </a:p>
+        </p:txBody>
+      </p:sp>
+      <p:sp>
+        <p:nvSpPr>
+          <p:cNvPr id="6" name="投影片編號版面配置區 5"/>
+          <p:cNvSpPr>
+            <a:spLocks noGrp="1"/>
+          </p:cNvSpPr>
+          <p:nvPr>
+            <p:ph type="sldNum" sz="quarter" idx="12"/>
+          </p:nvPr>
+        </p:nvSpPr>
+        <p:spPr>
+          <a:xfrm>
+            <a:off x="6553200" y="6356350"/>
+            <a:ext cx="2133600" cy="404246"/>
+          </a:xfrm>
+        </p:spPr>
+        <p:txBody>
+          <a:bodyPr/>
+          <a:lstStyle/>
+          <a:p>
+            <a:fld id="{E4D7E63D-91F2-4366-A2C4-1B00C9E2590E}" type="slidenum">
+              <a:rPr lang="zh-TW" altLang="en-US" smtClean="0"/>
+              <a:pPr/>
+              <a:t>25</a:t>
+            </a:fld>
+            <a:endParaRPr lang="zh-TW" altLang="en-US"/>
+          </a:p>
+        </p:txBody>
+      </p:sp>
+    </p:spTree>
+    <p:extLst>
+      <p:ext uri="{BB962C8B-B14F-4D97-AF65-F5344CB8AC3E}">
+        <p14:creationId xmlns:p14="http://schemas.microsoft.com/office/powerpoint/2010/main" val="585981651"/>
+      </p:ext>
+    </p:extLst>
+  </p:cSld>
+  <p:clrMapOvr>
+    <a:masterClrMapping/>
+  </p:clrMapOvr>
+</p:sld>
+</file>
+
+<file path=ppt/slides/slide26.xml><?xml version="1.0" encoding="utf-8"?>
+<p:sld xmlns:a="http://schemas.openxmlformats.org/drawingml/2006/main" xmlns:r="http://schemas.openxmlformats.org/officeDocument/2006/relationships" xmlns:p="http://schemas.openxmlformats.org/presentationml/2006/main">
+  <p:cSld>
+    <p:spTree>
+      <p:nvGrpSpPr>
+        <p:cNvPr id="1" name=""/>
+        <p:cNvGrpSpPr/>
+        <p:nvPr/>
+      </p:nvGrpSpPr>
+      <p:grpSpPr>
+        <a:xfrm>
+          <a:off x="0" y="0"/>
+          <a:ext cx="0" cy="0"/>
+          <a:chOff x="0" y="0"/>
+          <a:chExt cx="0" cy="0"/>
+        </a:xfrm>
+      </p:grpSpPr>
+      <p:sp>
+        <p:nvSpPr>
+          <p:cNvPr id="2" name="標題 1"/>
+          <p:cNvSpPr>
+            <a:spLocks noGrp="1"/>
+          </p:cNvSpPr>
+          <p:nvPr>
+            <p:ph type="ctrTitle"/>
+          </p:nvPr>
+        </p:nvSpPr>
+        <p:spPr>
+          <a:xfrm>
+            <a:off x="0" y="1"/>
+            <a:ext cx="9144000" cy="764704"/>
+          </a:xfrm>
+          <a:gradFill flip="none" rotWithShape="1">
+            <a:gsLst>
+              <a:gs pos="0">
+                <a:srgbClr val="C00000">
+                  <a:shade val="30000"/>
+                  <a:satMod val="115000"/>
+                </a:srgbClr>
+              </a:gs>
+              <a:gs pos="50000">
+                <a:srgbClr val="C00000">
+                  <a:shade val="67500"/>
+                  <a:satMod val="115000"/>
+                </a:srgbClr>
+              </a:gs>
+              <a:gs pos="100000">
+                <a:srgbClr val="C00000">
+                  <a:shade val="100000"/>
+                  <a:satMod val="115000"/>
+                </a:srgbClr>
+              </a:gs>
+            </a:gsLst>
+            <a:path path="circle">
+              <a:fillToRect t="100000" r="100000"/>
+            </a:path>
+            <a:tileRect l="-100000" b="-100000"/>
+          </a:gradFill>
+        </p:spPr>
+        <p:txBody>
+          <a:bodyPr>
+            <a:normAutofit/>
+          </a:bodyPr>
+          <a:lstStyle/>
+          <a:p>
+            <a:pPr algn="l"/>
+            <a:r>
+              <a:rPr lang="en-US" altLang="zh-TW" b="1" dirty="0">
+                <a:solidFill>
+                  <a:srgbClr val="FFFF00"/>
+                </a:solidFill>
+              </a:rPr>
+              <a:t>11.6 Quiz</a:t>
+            </a:r>
+            <a:endParaRPr lang="zh-TW" altLang="en-US" b="1" dirty="0">
+              <a:solidFill>
+                <a:srgbClr val="FFFF00"/>
+              </a:solidFill>
+            </a:endParaRPr>
+          </a:p>
+        </p:txBody>
+      </p:sp>
+      <p:sp>
+        <p:nvSpPr>
+          <p:cNvPr id="3" name="副標題 2"/>
+          <p:cNvSpPr>
+            <a:spLocks noGrp="1"/>
+          </p:cNvSpPr>
+          <p:nvPr>
+            <p:ph type="subTitle" idx="1"/>
+          </p:nvPr>
+        </p:nvSpPr>
+        <p:spPr>
+          <a:xfrm>
+            <a:off x="467544" y="1340765"/>
+            <a:ext cx="8064896" cy="5015585"/>
+          </a:xfrm>
+          <a:ln>
+            <a:solidFill>
+              <a:srgbClr val="C00000"/>
+            </a:solidFill>
+          </a:ln>
+        </p:spPr>
+        <p:txBody>
+          <a:bodyPr>
+            <a:noAutofit/>
+          </a:bodyPr>
+          <a:lstStyle/>
+          <a:p>
+            <a:pPr marL="342900" indent="-342900" algn="l">
+              <a:buClr>
+                <a:srgbClr val="0070C0"/>
+              </a:buClr>
+              <a:buSzPct val="80000"/>
+              <a:buFont typeface="Wingdings" pitchFamily="2" charset="2"/>
+              <a:buChar char="u"/>
+            </a:pPr>
+            <a:r>
+              <a:rPr lang="en-US" altLang="zh-TW" sz="1600" b="1" dirty="0">
+                <a:solidFill>
+                  <a:schemeClr val="tx1"/>
+                </a:solidFill>
+                <a:latin typeface="+mj-lt"/>
+              </a:rPr>
+              <a:t>Quiz:</a:t>
+            </a:r>
+          </a:p>
+          <a:p>
+            <a:pPr marL="342900" indent="-342900" algn="l">
+              <a:buClr>
+                <a:srgbClr val="0070C0"/>
+              </a:buClr>
+              <a:buSzPct val="80000"/>
+              <a:buFont typeface="Wingdings" pitchFamily="2" charset="2"/>
+              <a:buChar char="u"/>
+            </a:pPr>
+            <a:r>
+              <a:rPr lang="en-US" altLang="zh-TW" sz="1600" b="1" dirty="0">
+                <a:solidFill>
+                  <a:schemeClr val="tx1"/>
+                </a:solidFill>
+                <a:latin typeface="+mj-lt"/>
+              </a:rPr>
+              <a:t>8. React does not update by </a:t>
+            </a:r>
+            <a:r>
+              <a:rPr lang="en-US" altLang="zh-TW" sz="1600" b="1" dirty="0" err="1">
+                <a:solidFill>
+                  <a:schemeClr val="tx1"/>
+                </a:solidFill>
+                <a:latin typeface="+mj-lt"/>
+              </a:rPr>
+              <a:t>this.state.count</a:t>
+            </a:r>
+            <a:r>
+              <a:rPr lang="en-US" altLang="zh-TW" sz="1600" b="1" dirty="0">
+                <a:solidFill>
+                  <a:schemeClr val="tx1"/>
+                </a:solidFill>
+                <a:latin typeface="+mj-lt"/>
+              </a:rPr>
+              <a:t> = </a:t>
+            </a:r>
+            <a:r>
+              <a:rPr lang="en-US" altLang="zh-TW" sz="1600" b="1" dirty="0" err="1">
+                <a:solidFill>
+                  <a:schemeClr val="tx1"/>
+                </a:solidFill>
+                <a:latin typeface="+mj-lt"/>
+              </a:rPr>
+              <a:t>this.state.count</a:t>
+            </a:r>
+            <a:r>
+              <a:rPr lang="en-US" altLang="zh-TW" sz="1600" b="1" dirty="0">
+                <a:solidFill>
+                  <a:schemeClr val="tx1"/>
+                </a:solidFill>
+                <a:latin typeface="+mj-lt"/>
+              </a:rPr>
+              <a:t> + 1, we have to use </a:t>
+            </a:r>
+            <a:r>
+              <a:rPr lang="en-US" altLang="zh-TW" sz="1600" b="1" dirty="0" err="1">
+                <a:solidFill>
+                  <a:schemeClr val="tx1"/>
+                </a:solidFill>
+                <a:latin typeface="+mj-lt"/>
+              </a:rPr>
+              <a:t>setState</a:t>
+            </a:r>
+            <a:r>
+              <a:rPr lang="en-US" altLang="zh-TW" sz="1600" b="1" dirty="0">
+                <a:solidFill>
+                  <a:schemeClr val="tx1"/>
+                </a:solidFill>
+                <a:latin typeface="+mj-lt"/>
+              </a:rPr>
+              <a:t>(). What is </a:t>
+            </a:r>
+            <a:r>
+              <a:rPr lang="en-US" altLang="zh-TW" sz="1600" b="1" dirty="0" err="1">
+                <a:solidFill>
+                  <a:schemeClr val="tx1"/>
+                </a:solidFill>
+                <a:latin typeface="+mj-lt"/>
+              </a:rPr>
+              <a:t>setState</a:t>
+            </a:r>
+            <a:r>
+              <a:rPr lang="en-US" altLang="zh-TW" sz="1600" b="1" dirty="0">
+                <a:solidFill>
+                  <a:schemeClr val="tx1"/>
+                </a:solidFill>
+                <a:latin typeface="+mj-lt"/>
+              </a:rPr>
+              <a:t>() code looks like?</a:t>
+            </a:r>
+          </a:p>
+          <a:p>
+            <a:pPr marL="342900" indent="-342900" algn="l">
+              <a:buClr>
+                <a:srgbClr val="0070C0"/>
+              </a:buClr>
+              <a:buSzPct val="80000"/>
+              <a:buFont typeface="Wingdings" pitchFamily="2" charset="2"/>
+              <a:buChar char="u"/>
+            </a:pPr>
+            <a:r>
+              <a:rPr lang="en-US" altLang="zh-TW" sz="1600" b="1" dirty="0">
+                <a:solidFill>
+                  <a:schemeClr val="tx1"/>
+                </a:solidFill>
+                <a:latin typeface="+mj-lt"/>
+              </a:rPr>
+              <a:t>Ans:</a:t>
+            </a:r>
+          </a:p>
+          <a:p>
+            <a:pPr marL="342900" indent="-342900" algn="l">
+              <a:buClr>
+                <a:srgbClr val="0070C0"/>
+              </a:buClr>
+              <a:buSzPct val="80000"/>
+              <a:buFont typeface="Wingdings" pitchFamily="2" charset="2"/>
+              <a:buChar char="u"/>
+            </a:pPr>
+            <a:r>
+              <a:rPr lang="en-US" altLang="zh-TW" sz="1600" b="1" dirty="0">
+                <a:solidFill>
+                  <a:schemeClr val="tx1"/>
+                </a:solidFill>
+                <a:latin typeface="+mj-lt"/>
+              </a:rPr>
+              <a:t>&gt; class … {</a:t>
+            </a:r>
+          </a:p>
+          <a:p>
+            <a:pPr marL="342900" indent="-342900" algn="l">
+              <a:buClr>
+                <a:srgbClr val="0070C0"/>
+              </a:buClr>
+              <a:buSzPct val="80000"/>
+              <a:buFont typeface="Wingdings" pitchFamily="2" charset="2"/>
+              <a:buChar char="u"/>
+            </a:pPr>
+            <a:r>
+              <a:rPr lang="en-US" altLang="zh-TW" sz="1600" b="1" dirty="0">
+                <a:solidFill>
+                  <a:schemeClr val="tx1"/>
+                </a:solidFill>
+                <a:latin typeface="+mj-lt"/>
+              </a:rPr>
+              <a:t>&gt;    increment () {</a:t>
+            </a:r>
+          </a:p>
+          <a:p>
+            <a:pPr marL="342900" indent="-342900" algn="l">
+              <a:buClr>
+                <a:srgbClr val="0070C0"/>
+              </a:buClr>
+              <a:buSzPct val="80000"/>
+              <a:buFont typeface="Wingdings" pitchFamily="2" charset="2"/>
+              <a:buChar char="u"/>
+            </a:pPr>
+            <a:r>
+              <a:rPr lang="en-US" altLang="zh-TW" sz="1600" b="1" dirty="0">
+                <a:solidFill>
+                  <a:schemeClr val="tx1"/>
+                </a:solidFill>
+                <a:latin typeface="+mj-lt"/>
+              </a:rPr>
+              <a:t>&gt;        //</a:t>
+            </a:r>
+            <a:r>
+              <a:rPr lang="en-US" altLang="zh-TW" sz="1600" b="1" dirty="0" err="1">
+                <a:solidFill>
+                  <a:srgbClr val="C00000"/>
+                </a:solidFill>
+                <a:latin typeface="+mj-lt"/>
+              </a:rPr>
+              <a:t>this.state.count</a:t>
+            </a:r>
+            <a:r>
+              <a:rPr lang="en-US" altLang="zh-TW" sz="1600" b="1" dirty="0">
+                <a:solidFill>
+                  <a:srgbClr val="C00000"/>
+                </a:solidFill>
+                <a:latin typeface="+mj-lt"/>
+              </a:rPr>
+              <a:t> </a:t>
+            </a:r>
+            <a:r>
+              <a:rPr lang="en-US" altLang="zh-TW" sz="1600" b="1" dirty="0">
+                <a:solidFill>
+                  <a:schemeClr val="tx1"/>
+                </a:solidFill>
+                <a:latin typeface="+mj-lt"/>
+              </a:rPr>
+              <a:t>= </a:t>
+            </a:r>
+            <a:r>
+              <a:rPr lang="en-US" altLang="zh-TW" sz="1600" b="1" dirty="0" err="1">
+                <a:solidFill>
+                  <a:schemeClr val="tx1"/>
+                </a:solidFill>
+                <a:latin typeface="+mj-lt"/>
+              </a:rPr>
+              <a:t>this.state.count</a:t>
+            </a:r>
+            <a:r>
+              <a:rPr lang="en-US" altLang="zh-TW" sz="1600" b="1" dirty="0">
+                <a:solidFill>
+                  <a:schemeClr val="tx1"/>
+                </a:solidFill>
+                <a:latin typeface="+mj-lt"/>
+              </a:rPr>
+              <a:t>  + 1</a:t>
+            </a:r>
+          </a:p>
+          <a:p>
+            <a:pPr marL="342900" indent="-342900" algn="l">
+              <a:buClr>
+                <a:srgbClr val="0070C0"/>
+              </a:buClr>
+              <a:buSzPct val="80000"/>
+              <a:buFont typeface="Wingdings" pitchFamily="2" charset="2"/>
+              <a:buChar char="u"/>
+            </a:pPr>
+            <a:r>
+              <a:rPr lang="en-US" altLang="zh-TW" sz="1600" b="1" dirty="0">
+                <a:solidFill>
+                  <a:schemeClr val="tx1"/>
+                </a:solidFill>
+                <a:latin typeface="+mj-lt"/>
+              </a:rPr>
+              <a:t>&gt;        </a:t>
+            </a:r>
+            <a:r>
+              <a:rPr lang="en-US" altLang="zh-TW" sz="1600" b="1" dirty="0" err="1">
+                <a:solidFill>
+                  <a:srgbClr val="C00000"/>
+                </a:solidFill>
+                <a:latin typeface="+mj-lt"/>
+              </a:rPr>
+              <a:t>this.setState</a:t>
+            </a:r>
+            <a:r>
+              <a:rPr lang="en-US" altLang="zh-TW" sz="1600" b="1" dirty="0">
+                <a:solidFill>
+                  <a:srgbClr val="C00000"/>
+                </a:solidFill>
+                <a:latin typeface="+mj-lt"/>
+              </a:rPr>
+              <a:t> (</a:t>
+            </a:r>
+          </a:p>
+          <a:p>
+            <a:pPr marL="342900" indent="-342900" algn="l">
+              <a:buClr>
+                <a:srgbClr val="0070C0"/>
+              </a:buClr>
+              <a:buSzPct val="80000"/>
+              <a:buFont typeface="Wingdings" pitchFamily="2" charset="2"/>
+              <a:buChar char="u"/>
+            </a:pPr>
+            <a:r>
+              <a:rPr lang="en-US" altLang="zh-TW" sz="1600" b="1" dirty="0">
+                <a:solidFill>
+                  <a:srgbClr val="C00000"/>
+                </a:solidFill>
+                <a:latin typeface="+mj-lt"/>
+              </a:rPr>
+              <a:t>&gt;           </a:t>
+            </a:r>
+            <a:r>
+              <a:rPr lang="en-US" altLang="zh-TW" sz="1600" b="1" dirty="0" err="1">
+                <a:solidFill>
+                  <a:srgbClr val="C00000"/>
+                </a:solidFill>
+                <a:latin typeface="+mj-lt"/>
+              </a:rPr>
+              <a:t>this.state</a:t>
+            </a:r>
+            <a:r>
+              <a:rPr lang="en-US" altLang="zh-TW" sz="1600" b="1" dirty="0">
+                <a:solidFill>
+                  <a:srgbClr val="C00000"/>
+                </a:solidFill>
+                <a:latin typeface="+mj-lt"/>
+              </a:rPr>
+              <a:t> {</a:t>
+            </a:r>
+          </a:p>
+          <a:p>
+            <a:pPr marL="342900" indent="-342900" algn="l">
+              <a:buClr>
+                <a:srgbClr val="0070C0"/>
+              </a:buClr>
+              <a:buSzPct val="80000"/>
+              <a:buFont typeface="Wingdings" pitchFamily="2" charset="2"/>
+              <a:buChar char="u"/>
+            </a:pPr>
+            <a:r>
+              <a:rPr lang="en-US" altLang="zh-TW" sz="1600" b="1" dirty="0">
+                <a:solidFill>
+                  <a:srgbClr val="C00000"/>
+                </a:solidFill>
+                <a:latin typeface="+mj-lt"/>
+              </a:rPr>
+              <a:t>&gt;               count: </a:t>
+            </a:r>
+            <a:r>
+              <a:rPr lang="en-US" altLang="zh-TW" sz="1600" b="1" dirty="0" err="1">
+                <a:solidFill>
+                  <a:srgbClr val="C00000"/>
+                </a:solidFill>
+                <a:latin typeface="+mj-lt"/>
+              </a:rPr>
+              <a:t>this.state.count</a:t>
+            </a:r>
+            <a:r>
+              <a:rPr lang="en-US" altLang="zh-TW" sz="1600" b="1" dirty="0">
+                <a:solidFill>
+                  <a:srgbClr val="C00000"/>
+                </a:solidFill>
+                <a:latin typeface="+mj-lt"/>
+              </a:rPr>
+              <a:t> + 1</a:t>
+            </a:r>
+          </a:p>
+          <a:p>
+            <a:pPr marL="342900" indent="-342900" algn="l">
+              <a:buClr>
+                <a:srgbClr val="0070C0"/>
+              </a:buClr>
+              <a:buSzPct val="80000"/>
+              <a:buFont typeface="Wingdings" pitchFamily="2" charset="2"/>
+              <a:buChar char="u"/>
+            </a:pPr>
+            <a:r>
+              <a:rPr lang="en-US" altLang="zh-TW" sz="1600" b="1" dirty="0">
+                <a:solidFill>
+                  <a:srgbClr val="C00000"/>
+                </a:solidFill>
+                <a:latin typeface="+mj-lt"/>
+              </a:rPr>
+              <a:t>&gt;           }</a:t>
+            </a:r>
+          </a:p>
+          <a:p>
+            <a:pPr marL="342900" indent="-342900" algn="l">
+              <a:buClr>
+                <a:srgbClr val="0070C0"/>
+              </a:buClr>
+              <a:buSzPct val="80000"/>
+              <a:buFont typeface="Wingdings" pitchFamily="2" charset="2"/>
+              <a:buChar char="u"/>
+            </a:pPr>
+            <a:r>
+              <a:rPr lang="en-US" altLang="zh-TW" sz="1600" b="1" dirty="0">
+                <a:solidFill>
+                  <a:srgbClr val="C00000"/>
+                </a:solidFill>
+                <a:latin typeface="+mj-lt"/>
+              </a:rPr>
+              <a:t>&gt;        }</a:t>
+            </a:r>
+          </a:p>
+          <a:p>
+            <a:pPr marL="342900" indent="-342900" algn="l">
+              <a:buClr>
+                <a:srgbClr val="0070C0"/>
+              </a:buClr>
+              <a:buSzPct val="80000"/>
+              <a:buFont typeface="Wingdings" pitchFamily="2" charset="2"/>
+              <a:buChar char="u"/>
+            </a:pPr>
+            <a:r>
+              <a:rPr lang="en-US" altLang="zh-TW" sz="1600" b="1" dirty="0">
+                <a:solidFill>
+                  <a:schemeClr val="tx1"/>
+                </a:solidFill>
+                <a:latin typeface="+mj-lt"/>
+              </a:rPr>
+              <a:t>&gt;    }</a:t>
+            </a:r>
+          </a:p>
+          <a:p>
+            <a:pPr marL="342900" indent="-342900" algn="l">
+              <a:buClr>
+                <a:srgbClr val="0070C0"/>
+              </a:buClr>
+              <a:buSzPct val="80000"/>
+              <a:buFont typeface="Wingdings" pitchFamily="2" charset="2"/>
+              <a:buChar char="u"/>
+            </a:pPr>
+            <a:r>
+              <a:rPr lang="en-US" altLang="zh-TW" sz="1600" b="1" dirty="0">
+                <a:solidFill>
+                  <a:schemeClr val="tx1"/>
+                </a:solidFill>
+                <a:latin typeface="+mj-lt"/>
+              </a:rPr>
+              <a:t>&gt;}</a:t>
+            </a:r>
+          </a:p>
+        </p:txBody>
+      </p:sp>
+      <p:sp>
+        <p:nvSpPr>
+          <p:cNvPr id="4" name="標題 1"/>
+          <p:cNvSpPr txBox="1">
+            <a:spLocks/>
+          </p:cNvSpPr>
+          <p:nvPr/>
+        </p:nvSpPr>
+        <p:spPr>
+          <a:xfrm>
+            <a:off x="0" y="764704"/>
+            <a:ext cx="9144000" cy="398616"/>
+          </a:xfrm>
+          <a:prstGeom prst="rect">
+            <a:avLst/>
+          </a:prstGeom>
+          <a:gradFill flip="none" rotWithShape="1">
+            <a:gsLst>
+              <a:gs pos="0">
+                <a:srgbClr val="00B0F0">
+                  <a:shade val="30000"/>
+                  <a:satMod val="115000"/>
+                </a:srgbClr>
+              </a:gs>
+              <a:gs pos="50000">
+                <a:srgbClr val="00B0F0">
+                  <a:shade val="67500"/>
+                  <a:satMod val="115000"/>
+                </a:srgbClr>
+              </a:gs>
+              <a:gs pos="100000">
+                <a:srgbClr val="00B0F0">
+                  <a:shade val="100000"/>
+                  <a:satMod val="115000"/>
+                </a:srgbClr>
+              </a:gs>
+            </a:gsLst>
+            <a:path path="circle">
+              <a:fillToRect t="100000" r="100000"/>
+            </a:path>
+            <a:tileRect l="-100000" b="-100000"/>
+          </a:gradFill>
+        </p:spPr>
+        <p:txBody>
+          <a:bodyPr vert="horz" lIns="91440" tIns="45720" rIns="91440" bIns="45720" rtlCol="0" anchor="ctr">
+            <a:normAutofit/>
+          </a:bodyPr>
+          <a:lstStyle/>
+          <a:p>
+            <a:r>
+              <a:rPr lang="en-US" sz="1600" dirty="0">
+                <a:hlinkClick r:id="rId2"/>
+              </a:rPr>
+              <a:t>https://www.youtube.com/watch?v=uirRaVjRsf4&amp;list=PLC3y8-rFHvwgg3vaYJgHGnModB54rxOk3&amp;index=11</a:t>
+            </a:r>
+            <a:endParaRPr lang="en-US" altLang="zh-TW" sz="1600" b="1" i="1" dirty="0"/>
+          </a:p>
+        </p:txBody>
+      </p:sp>
+      <p:sp>
+        <p:nvSpPr>
+          <p:cNvPr id="5" name="日期版面配置區 4"/>
+          <p:cNvSpPr>
+            <a:spLocks noGrp="1"/>
+          </p:cNvSpPr>
+          <p:nvPr>
+            <p:ph type="dt" sz="half" idx="10"/>
+          </p:nvPr>
+        </p:nvSpPr>
+        <p:spPr>
+          <a:xfrm>
+            <a:off x="457200" y="6356350"/>
+            <a:ext cx="2133600" cy="404246"/>
+          </a:xfrm>
+        </p:spPr>
+        <p:txBody>
+          <a:bodyPr/>
+          <a:lstStyle/>
+          <a:p>
+            <a:fld id="{A4F910E6-8D00-4BAF-8C48-9688E0B449D3}" type="datetime1">
+              <a:rPr lang="zh-TW" altLang="en-US" smtClean="0"/>
+              <a:pPr/>
+              <a:t>2020/6/28</a:t>
+            </a:fld>
+            <a:endParaRPr lang="zh-TW" altLang="en-US"/>
+          </a:p>
+        </p:txBody>
+      </p:sp>
+      <p:sp>
+        <p:nvSpPr>
+          <p:cNvPr id="6" name="投影片編號版面配置區 5"/>
+          <p:cNvSpPr>
+            <a:spLocks noGrp="1"/>
+          </p:cNvSpPr>
+          <p:nvPr>
+            <p:ph type="sldNum" sz="quarter" idx="12"/>
+          </p:nvPr>
+        </p:nvSpPr>
+        <p:spPr>
+          <a:xfrm>
+            <a:off x="6553200" y="6356350"/>
+            <a:ext cx="2133600" cy="404246"/>
+          </a:xfrm>
+        </p:spPr>
+        <p:txBody>
+          <a:bodyPr/>
+          <a:lstStyle/>
+          <a:p>
+            <a:fld id="{E4D7E63D-91F2-4366-A2C4-1B00C9E2590E}" type="slidenum">
+              <a:rPr lang="zh-TW" altLang="en-US" smtClean="0"/>
+              <a:pPr/>
+              <a:t>26</a:t>
+            </a:fld>
+            <a:endParaRPr lang="zh-TW" altLang="en-US"/>
+          </a:p>
+        </p:txBody>
+      </p:sp>
+    </p:spTree>
+    <p:extLst>
+      <p:ext uri="{BB962C8B-B14F-4D97-AF65-F5344CB8AC3E}">
+        <p14:creationId xmlns:p14="http://schemas.microsoft.com/office/powerpoint/2010/main" val="1003207365"/>
+      </p:ext>
+    </p:extLst>
+  </p:cSld>
+  <p:clrMapOvr>
+    <a:masterClrMapping/>
+  </p:clrMapOvr>
+</p:sld>
+</file>
+
+<file path=ppt/slides/slide27.xml><?xml version="1.0" encoding="utf-8"?>
+<p:sld xmlns:a="http://schemas.openxmlformats.org/drawingml/2006/main" xmlns:r="http://schemas.openxmlformats.org/officeDocument/2006/relationships" xmlns:p="http://schemas.openxmlformats.org/presentationml/2006/main">
+  <p:cSld>
+    <p:spTree>
+      <p:nvGrpSpPr>
+        <p:cNvPr id="1" name=""/>
+        <p:cNvGrpSpPr/>
+        <p:nvPr/>
+      </p:nvGrpSpPr>
+      <p:grpSpPr>
+        <a:xfrm>
+          <a:off x="0" y="0"/>
+          <a:ext cx="0" cy="0"/>
+          <a:chOff x="0" y="0"/>
+          <a:chExt cx="0" cy="0"/>
+        </a:xfrm>
+      </p:grpSpPr>
+      <p:sp>
+        <p:nvSpPr>
+          <p:cNvPr id="2" name="標題 1"/>
+          <p:cNvSpPr>
+            <a:spLocks noGrp="1"/>
+          </p:cNvSpPr>
+          <p:nvPr>
+            <p:ph type="ctrTitle"/>
+          </p:nvPr>
+        </p:nvSpPr>
+        <p:spPr>
+          <a:xfrm>
+            <a:off x="0" y="1"/>
+            <a:ext cx="9144000" cy="764704"/>
+          </a:xfrm>
+          <a:gradFill flip="none" rotWithShape="1">
+            <a:gsLst>
+              <a:gs pos="0">
+                <a:srgbClr val="C00000">
+                  <a:shade val="30000"/>
+                  <a:satMod val="115000"/>
+                </a:srgbClr>
+              </a:gs>
+              <a:gs pos="50000">
+                <a:srgbClr val="C00000">
+                  <a:shade val="67500"/>
+                  <a:satMod val="115000"/>
+                </a:srgbClr>
+              </a:gs>
+              <a:gs pos="100000">
+                <a:srgbClr val="C00000">
+                  <a:shade val="100000"/>
+                  <a:satMod val="115000"/>
+                </a:srgbClr>
+              </a:gs>
+            </a:gsLst>
+            <a:path path="circle">
+              <a:fillToRect t="100000" r="100000"/>
+            </a:path>
+            <a:tileRect l="-100000" b="-100000"/>
+          </a:gradFill>
+        </p:spPr>
+        <p:txBody>
+          <a:bodyPr>
+            <a:normAutofit/>
+          </a:bodyPr>
+          <a:lstStyle/>
+          <a:p>
+            <a:pPr algn="l"/>
+            <a:r>
+              <a:rPr lang="en-US" altLang="zh-TW" b="1" dirty="0">
+                <a:solidFill>
+                  <a:srgbClr val="FFFF00"/>
+                </a:solidFill>
+              </a:rPr>
+              <a:t>11.6 Quiz</a:t>
+            </a:r>
+            <a:endParaRPr lang="zh-TW" altLang="en-US" b="1" dirty="0">
+              <a:solidFill>
+                <a:srgbClr val="FFFF00"/>
+              </a:solidFill>
+            </a:endParaRPr>
+          </a:p>
+        </p:txBody>
+      </p:sp>
+      <p:sp>
+        <p:nvSpPr>
+          <p:cNvPr id="3" name="副標題 2"/>
+          <p:cNvSpPr>
+            <a:spLocks noGrp="1"/>
+          </p:cNvSpPr>
+          <p:nvPr>
+            <p:ph type="subTitle" idx="1"/>
+          </p:nvPr>
+        </p:nvSpPr>
+        <p:spPr>
+          <a:xfrm>
+            <a:off x="467544" y="1340766"/>
+            <a:ext cx="8064896" cy="4616970"/>
+          </a:xfrm>
+          <a:ln>
+            <a:solidFill>
+              <a:srgbClr val="C00000"/>
+            </a:solidFill>
+          </a:ln>
+        </p:spPr>
+        <p:txBody>
+          <a:bodyPr>
+            <a:noAutofit/>
+          </a:bodyPr>
+          <a:lstStyle/>
+          <a:p>
+            <a:pPr marL="342900" indent="-342900" algn="l">
+              <a:buClr>
+                <a:srgbClr val="0070C0"/>
+              </a:buClr>
+              <a:buSzPct val="80000"/>
+              <a:buFont typeface="Wingdings" pitchFamily="2" charset="2"/>
+              <a:buChar char="u"/>
+            </a:pPr>
+            <a:r>
+              <a:rPr lang="en-US" altLang="zh-TW" sz="1200" b="1" dirty="0">
+                <a:solidFill>
+                  <a:schemeClr val="tx1"/>
+                </a:solidFill>
+                <a:latin typeface="+mj-lt"/>
+              </a:rPr>
+              <a:t>Quiz:</a:t>
+            </a:r>
+          </a:p>
+          <a:p>
+            <a:pPr marL="342900" indent="-342900" algn="l">
+              <a:buClr>
+                <a:srgbClr val="0070C0"/>
+              </a:buClr>
+              <a:buSzPct val="80000"/>
+              <a:buFont typeface="Wingdings" pitchFamily="2" charset="2"/>
+              <a:buChar char="u"/>
+            </a:pPr>
+            <a:r>
+              <a:rPr lang="en-US" altLang="zh-TW" sz="1200" b="1" dirty="0">
+                <a:solidFill>
+                  <a:schemeClr val="tx1"/>
+                </a:solidFill>
+                <a:latin typeface="+mj-lt"/>
+              </a:rPr>
+              <a:t>9. How to add a on click button and call a function increment() to increment the counter display?</a:t>
+            </a:r>
+          </a:p>
+          <a:p>
+            <a:pPr marL="342900" indent="-342900" algn="l">
+              <a:buClr>
+                <a:srgbClr val="0070C0"/>
+              </a:buClr>
+              <a:buSzPct val="80000"/>
+              <a:buFont typeface="Wingdings" pitchFamily="2" charset="2"/>
+              <a:buChar char="u"/>
+            </a:pPr>
+            <a:r>
+              <a:rPr lang="en-US" altLang="zh-TW" sz="1200" b="1" dirty="0">
+                <a:solidFill>
+                  <a:schemeClr val="tx1"/>
+                </a:solidFill>
+                <a:latin typeface="+mj-lt"/>
+              </a:rPr>
+              <a:t>Ans:</a:t>
+            </a:r>
+          </a:p>
+          <a:p>
+            <a:pPr marL="342900" indent="-342900" algn="l">
+              <a:buClr>
+                <a:srgbClr val="0070C0"/>
+              </a:buClr>
+              <a:buSzPct val="80000"/>
+              <a:buFont typeface="Wingdings" pitchFamily="2" charset="2"/>
+              <a:buChar char="u"/>
+            </a:pPr>
+            <a:r>
+              <a:rPr lang="en-US" altLang="zh-TW" sz="1200" b="1" dirty="0">
+                <a:solidFill>
+                  <a:schemeClr val="tx1"/>
+                </a:solidFill>
+                <a:latin typeface="+mj-lt"/>
+              </a:rPr>
+              <a:t>&gt; class … {</a:t>
+            </a:r>
+          </a:p>
+          <a:p>
+            <a:pPr marL="342900" indent="-342900" algn="l">
+              <a:buClr>
+                <a:srgbClr val="0070C0"/>
+              </a:buClr>
+              <a:buSzPct val="80000"/>
+              <a:buFont typeface="Wingdings" pitchFamily="2" charset="2"/>
+              <a:buChar char="u"/>
+            </a:pPr>
+            <a:r>
+              <a:rPr lang="en-US" altLang="zh-TW" sz="1200" b="1" dirty="0">
+                <a:solidFill>
+                  <a:schemeClr val="tx1"/>
+                </a:solidFill>
+                <a:latin typeface="+mj-lt"/>
+              </a:rPr>
+              <a:t>&gt;    increment () {</a:t>
+            </a:r>
+          </a:p>
+          <a:p>
+            <a:pPr marL="342900" indent="-342900" algn="l">
+              <a:buClr>
+                <a:srgbClr val="0070C0"/>
+              </a:buClr>
+              <a:buSzPct val="80000"/>
+              <a:buFont typeface="Wingdings" pitchFamily="2" charset="2"/>
+              <a:buChar char="u"/>
+            </a:pPr>
+            <a:r>
+              <a:rPr lang="en-US" altLang="zh-TW" sz="1200" b="1" dirty="0">
+                <a:solidFill>
+                  <a:schemeClr val="tx1"/>
+                </a:solidFill>
+                <a:latin typeface="+mj-lt"/>
+              </a:rPr>
+              <a:t>&gt;        //</a:t>
+            </a:r>
+            <a:r>
+              <a:rPr lang="en-US" altLang="zh-TW" sz="1200" b="1" dirty="0" err="1">
+                <a:solidFill>
+                  <a:srgbClr val="C00000"/>
+                </a:solidFill>
+                <a:latin typeface="+mj-lt"/>
+              </a:rPr>
+              <a:t>this.state.count</a:t>
+            </a:r>
+            <a:r>
+              <a:rPr lang="en-US" altLang="zh-TW" sz="1200" b="1" dirty="0">
+                <a:solidFill>
+                  <a:srgbClr val="C00000"/>
+                </a:solidFill>
+                <a:latin typeface="+mj-lt"/>
+              </a:rPr>
+              <a:t> </a:t>
+            </a:r>
+            <a:r>
+              <a:rPr lang="en-US" altLang="zh-TW" sz="1200" b="1" dirty="0">
+                <a:solidFill>
+                  <a:schemeClr val="tx1"/>
+                </a:solidFill>
+                <a:latin typeface="+mj-lt"/>
+              </a:rPr>
+              <a:t>= </a:t>
+            </a:r>
+            <a:r>
+              <a:rPr lang="en-US" altLang="zh-TW" sz="1200" b="1" dirty="0" err="1">
+                <a:solidFill>
+                  <a:schemeClr val="tx1"/>
+                </a:solidFill>
+                <a:latin typeface="+mj-lt"/>
+              </a:rPr>
+              <a:t>this.state.count</a:t>
+            </a:r>
+            <a:r>
+              <a:rPr lang="en-US" altLang="zh-TW" sz="1200" b="1" dirty="0">
+                <a:solidFill>
+                  <a:schemeClr val="tx1"/>
+                </a:solidFill>
+                <a:latin typeface="+mj-lt"/>
+              </a:rPr>
+              <a:t>  + 1</a:t>
+            </a:r>
+          </a:p>
+          <a:p>
+            <a:pPr marL="342900" indent="-342900" algn="l">
+              <a:buClr>
+                <a:srgbClr val="0070C0"/>
+              </a:buClr>
+              <a:buSzPct val="80000"/>
+              <a:buFont typeface="Wingdings" pitchFamily="2" charset="2"/>
+              <a:buChar char="u"/>
+            </a:pPr>
+            <a:r>
+              <a:rPr lang="en-US" altLang="zh-TW" sz="1200" b="1" dirty="0">
+                <a:solidFill>
+                  <a:schemeClr val="tx1"/>
+                </a:solidFill>
+                <a:latin typeface="+mj-lt"/>
+              </a:rPr>
+              <a:t>&gt;        </a:t>
+            </a:r>
+            <a:r>
+              <a:rPr lang="en-US" altLang="zh-TW" sz="1200" b="1" dirty="0" err="1">
+                <a:solidFill>
+                  <a:srgbClr val="C00000"/>
+                </a:solidFill>
+                <a:latin typeface="+mj-lt"/>
+              </a:rPr>
+              <a:t>this.setState</a:t>
+            </a:r>
+            <a:r>
+              <a:rPr lang="en-US" altLang="zh-TW" sz="1200" b="1" dirty="0">
+                <a:solidFill>
+                  <a:srgbClr val="C00000"/>
+                </a:solidFill>
+                <a:latin typeface="+mj-lt"/>
+              </a:rPr>
+              <a:t> (</a:t>
+            </a:r>
+          </a:p>
+          <a:p>
+            <a:pPr marL="342900" indent="-342900" algn="l">
+              <a:buClr>
+                <a:srgbClr val="0070C0"/>
+              </a:buClr>
+              <a:buSzPct val="80000"/>
+              <a:buFont typeface="Wingdings" pitchFamily="2" charset="2"/>
+              <a:buChar char="u"/>
+            </a:pPr>
+            <a:r>
+              <a:rPr lang="en-US" altLang="zh-TW" sz="1200" b="1" dirty="0">
+                <a:solidFill>
+                  <a:srgbClr val="C00000"/>
+                </a:solidFill>
+                <a:latin typeface="+mj-lt"/>
+              </a:rPr>
+              <a:t>&gt;           </a:t>
+            </a:r>
+            <a:r>
+              <a:rPr lang="en-US" altLang="zh-TW" sz="1200" b="1" dirty="0" err="1">
+                <a:solidFill>
+                  <a:srgbClr val="C00000"/>
+                </a:solidFill>
+                <a:latin typeface="+mj-lt"/>
+              </a:rPr>
+              <a:t>this.state</a:t>
+            </a:r>
+            <a:r>
+              <a:rPr lang="en-US" altLang="zh-TW" sz="1200" b="1" dirty="0">
+                <a:solidFill>
+                  <a:srgbClr val="C00000"/>
+                </a:solidFill>
+                <a:latin typeface="+mj-lt"/>
+              </a:rPr>
+              <a:t> {</a:t>
+            </a:r>
+          </a:p>
+          <a:p>
+            <a:pPr marL="342900" indent="-342900" algn="l">
+              <a:buClr>
+                <a:srgbClr val="0070C0"/>
+              </a:buClr>
+              <a:buSzPct val="80000"/>
+              <a:buFont typeface="Wingdings" pitchFamily="2" charset="2"/>
+              <a:buChar char="u"/>
+            </a:pPr>
+            <a:r>
+              <a:rPr lang="en-US" altLang="zh-TW" sz="1200" b="1" dirty="0">
+                <a:solidFill>
+                  <a:srgbClr val="C00000"/>
+                </a:solidFill>
+                <a:latin typeface="+mj-lt"/>
+              </a:rPr>
+              <a:t>&gt;               count: </a:t>
+            </a:r>
+            <a:r>
+              <a:rPr lang="en-US" altLang="zh-TW" sz="1200" b="1" dirty="0" err="1">
+                <a:solidFill>
+                  <a:srgbClr val="C00000"/>
+                </a:solidFill>
+                <a:latin typeface="+mj-lt"/>
+              </a:rPr>
+              <a:t>this.state.count</a:t>
+            </a:r>
+            <a:r>
+              <a:rPr lang="en-US" altLang="zh-TW" sz="1200" b="1" dirty="0">
+                <a:solidFill>
+                  <a:srgbClr val="C00000"/>
+                </a:solidFill>
+                <a:latin typeface="+mj-lt"/>
+              </a:rPr>
+              <a:t> + 1</a:t>
+            </a:r>
+          </a:p>
+          <a:p>
+            <a:pPr marL="342900" indent="-342900" algn="l">
+              <a:buClr>
+                <a:srgbClr val="0070C0"/>
+              </a:buClr>
+              <a:buSzPct val="80000"/>
+              <a:buFont typeface="Wingdings" pitchFamily="2" charset="2"/>
+              <a:buChar char="u"/>
+            </a:pPr>
+            <a:r>
+              <a:rPr lang="en-US" altLang="zh-TW" sz="1200" b="1" dirty="0">
+                <a:solidFill>
+                  <a:srgbClr val="C00000"/>
+                </a:solidFill>
+                <a:latin typeface="+mj-lt"/>
+              </a:rPr>
+              <a:t>&gt;           }</a:t>
+            </a:r>
+          </a:p>
+          <a:p>
+            <a:pPr marL="342900" indent="-342900" algn="l">
+              <a:buClr>
+                <a:srgbClr val="0070C0"/>
+              </a:buClr>
+              <a:buSzPct val="80000"/>
+              <a:buFont typeface="Wingdings" pitchFamily="2" charset="2"/>
+              <a:buChar char="u"/>
+            </a:pPr>
+            <a:r>
+              <a:rPr lang="en-US" altLang="zh-TW" sz="1200" b="1" dirty="0">
+                <a:solidFill>
+                  <a:srgbClr val="C00000"/>
+                </a:solidFill>
+                <a:latin typeface="+mj-lt"/>
+              </a:rPr>
+              <a:t>&gt;        }</a:t>
+            </a:r>
+          </a:p>
+          <a:p>
+            <a:pPr marL="342900" indent="-342900" algn="l">
+              <a:buClr>
+                <a:srgbClr val="0070C0"/>
+              </a:buClr>
+              <a:buSzPct val="80000"/>
+              <a:buFont typeface="Wingdings" pitchFamily="2" charset="2"/>
+              <a:buChar char="u"/>
+            </a:pPr>
+            <a:r>
+              <a:rPr lang="en-US" altLang="zh-TW" sz="1200" b="1" dirty="0">
+                <a:solidFill>
+                  <a:schemeClr val="tx1"/>
+                </a:solidFill>
+                <a:latin typeface="+mj-lt"/>
+              </a:rPr>
+              <a:t>&gt;    }</a:t>
+            </a:r>
+          </a:p>
+          <a:p>
+            <a:pPr marL="342900" indent="-342900" algn="l">
+              <a:buClr>
+                <a:srgbClr val="0070C0"/>
+              </a:buClr>
+              <a:buSzPct val="80000"/>
+              <a:buFont typeface="Wingdings" pitchFamily="2" charset="2"/>
+              <a:buChar char="u"/>
+            </a:pPr>
+            <a:r>
+              <a:rPr lang="en-US" altLang="zh-TW" sz="1200" b="1" dirty="0">
+                <a:solidFill>
+                  <a:schemeClr val="tx1"/>
+                </a:solidFill>
+                <a:latin typeface="+mj-lt"/>
+              </a:rPr>
+              <a:t>&gt;    render () {</a:t>
+            </a:r>
+          </a:p>
+          <a:p>
+            <a:pPr marL="342900" indent="-342900" algn="l">
+              <a:buClr>
+                <a:srgbClr val="0070C0"/>
+              </a:buClr>
+              <a:buSzPct val="80000"/>
+              <a:buFont typeface="Wingdings" pitchFamily="2" charset="2"/>
+              <a:buChar char="u"/>
+            </a:pPr>
+            <a:r>
+              <a:rPr lang="en-US" altLang="zh-TW" sz="1200" b="1" dirty="0">
+                <a:solidFill>
+                  <a:schemeClr val="tx1"/>
+                </a:solidFill>
+                <a:latin typeface="+mj-lt"/>
+              </a:rPr>
+              <a:t>&gt;       return (</a:t>
+            </a:r>
+          </a:p>
+          <a:p>
+            <a:pPr marL="342900" indent="-342900" algn="l">
+              <a:buClr>
+                <a:srgbClr val="0070C0"/>
+              </a:buClr>
+              <a:buSzPct val="80000"/>
+              <a:buFont typeface="Wingdings" pitchFamily="2" charset="2"/>
+              <a:buChar char="u"/>
+            </a:pPr>
+            <a:r>
+              <a:rPr lang="en-US" altLang="zh-TW" sz="1200" b="1" dirty="0">
+                <a:solidFill>
+                  <a:schemeClr val="tx1"/>
+                </a:solidFill>
+                <a:latin typeface="+mj-lt"/>
+              </a:rPr>
+              <a:t>&gt;            &lt;div&gt; </a:t>
+            </a:r>
+          </a:p>
+          <a:p>
+            <a:pPr marL="342900" indent="-342900" algn="l">
+              <a:buClr>
+                <a:srgbClr val="0070C0"/>
+              </a:buClr>
+              <a:buSzPct val="80000"/>
+              <a:buFont typeface="Wingdings" pitchFamily="2" charset="2"/>
+              <a:buChar char="u"/>
+            </a:pPr>
+            <a:r>
+              <a:rPr lang="en-US" altLang="zh-TW" sz="1200" b="1" dirty="0">
+                <a:solidFill>
+                  <a:schemeClr val="tx1"/>
+                </a:solidFill>
+                <a:latin typeface="+mj-lt"/>
+              </a:rPr>
+              <a:t>&gt;                &lt;p&gt;{ </a:t>
+            </a:r>
+            <a:r>
+              <a:rPr lang="en-US" altLang="zh-TW" sz="1200" b="1" dirty="0" err="1">
+                <a:solidFill>
+                  <a:srgbClr val="C00000"/>
+                </a:solidFill>
+                <a:latin typeface="+mj-lt"/>
+              </a:rPr>
+              <a:t>this.state.count</a:t>
+            </a:r>
+            <a:r>
+              <a:rPr lang="en-US" altLang="zh-TW" sz="1200" b="1" dirty="0">
+                <a:solidFill>
+                  <a:srgbClr val="C00000"/>
+                </a:solidFill>
+                <a:latin typeface="+mj-lt"/>
+              </a:rPr>
+              <a:t> </a:t>
+            </a:r>
+            <a:r>
+              <a:rPr lang="en-US" altLang="zh-TW" sz="1200" b="1" dirty="0">
+                <a:solidFill>
+                  <a:schemeClr val="tx1"/>
+                </a:solidFill>
+                <a:latin typeface="+mj-lt"/>
+              </a:rPr>
+              <a:t>} &lt;/p&gt;</a:t>
+            </a:r>
+          </a:p>
+          <a:p>
+            <a:pPr marL="342900" indent="-342900" algn="l">
+              <a:buClr>
+                <a:srgbClr val="0070C0"/>
+              </a:buClr>
+              <a:buSzPct val="80000"/>
+              <a:buFont typeface="Wingdings" pitchFamily="2" charset="2"/>
+              <a:buChar char="u"/>
+            </a:pPr>
+            <a:r>
+              <a:rPr lang="en-US" altLang="zh-TW" sz="1200" b="1" dirty="0">
+                <a:solidFill>
+                  <a:schemeClr val="tx1"/>
+                </a:solidFill>
+                <a:latin typeface="+mj-lt"/>
+              </a:rPr>
+              <a:t>&gt;                &lt;button </a:t>
+            </a:r>
+            <a:r>
+              <a:rPr lang="en-US" altLang="zh-TW" sz="1200" b="1" dirty="0" err="1">
+                <a:solidFill>
+                  <a:schemeClr val="tx1"/>
+                </a:solidFill>
+                <a:latin typeface="+mj-lt"/>
+              </a:rPr>
+              <a:t>onClick</a:t>
+            </a:r>
+            <a:r>
+              <a:rPr lang="en-US" altLang="zh-TW" sz="1200" b="1" dirty="0">
+                <a:solidFill>
+                  <a:schemeClr val="tx1"/>
+                </a:solidFill>
+                <a:latin typeface="+mj-lt"/>
+              </a:rPr>
+              <a:t> = { </a:t>
+            </a:r>
+            <a:r>
+              <a:rPr lang="en-US" altLang="zh-TW" sz="1200" b="1" dirty="0">
+                <a:solidFill>
+                  <a:srgbClr val="C00000"/>
+                </a:solidFill>
+                <a:latin typeface="+mj-lt"/>
+              </a:rPr>
+              <a:t>() =&gt; </a:t>
+            </a:r>
+            <a:r>
+              <a:rPr lang="en-US" altLang="zh-TW" sz="1200" b="1" dirty="0" err="1">
+                <a:solidFill>
+                  <a:srgbClr val="C00000"/>
+                </a:solidFill>
+                <a:latin typeface="+mj-lt"/>
+              </a:rPr>
+              <a:t>this.increment</a:t>
+            </a:r>
+            <a:r>
+              <a:rPr lang="en-US" altLang="zh-TW" sz="1200" b="1" dirty="0">
+                <a:solidFill>
+                  <a:srgbClr val="C00000"/>
+                </a:solidFill>
+                <a:latin typeface="+mj-lt"/>
+              </a:rPr>
+              <a:t>() </a:t>
+            </a:r>
+            <a:r>
+              <a:rPr lang="en-US" altLang="zh-TW" sz="1200" b="1" dirty="0">
+                <a:solidFill>
+                  <a:schemeClr val="tx1"/>
+                </a:solidFill>
+                <a:latin typeface="+mj-lt"/>
+              </a:rPr>
+              <a:t>} &gt; Increment &lt;/button&gt; </a:t>
+            </a:r>
+          </a:p>
+          <a:p>
+            <a:pPr marL="342900" indent="-342900" algn="l">
+              <a:buClr>
+                <a:srgbClr val="0070C0"/>
+              </a:buClr>
+              <a:buSzPct val="80000"/>
+              <a:buFont typeface="Wingdings" pitchFamily="2" charset="2"/>
+              <a:buChar char="u"/>
+            </a:pPr>
+            <a:r>
+              <a:rPr lang="en-US" altLang="zh-TW" sz="1200" b="1" dirty="0">
+                <a:solidFill>
+                  <a:schemeClr val="tx1"/>
+                </a:solidFill>
+                <a:latin typeface="+mj-lt"/>
+              </a:rPr>
+              <a:t>&gt;           &lt;/div&gt;</a:t>
+            </a:r>
+          </a:p>
+          <a:p>
+            <a:pPr marL="342900" indent="-342900" algn="l">
+              <a:buClr>
+                <a:srgbClr val="0070C0"/>
+              </a:buClr>
+              <a:buSzPct val="80000"/>
+              <a:buFont typeface="Wingdings" pitchFamily="2" charset="2"/>
+              <a:buChar char="u"/>
+            </a:pPr>
+            <a:r>
+              <a:rPr lang="en-US" altLang="zh-TW" sz="1200" b="1" dirty="0">
+                <a:solidFill>
+                  <a:schemeClr val="tx1"/>
+                </a:solidFill>
+                <a:latin typeface="+mj-lt"/>
+              </a:rPr>
+              <a:t>&gt;       )</a:t>
+            </a:r>
+          </a:p>
+          <a:p>
+            <a:pPr marL="342900" indent="-342900" algn="l">
+              <a:buClr>
+                <a:srgbClr val="0070C0"/>
+              </a:buClr>
+              <a:buSzPct val="80000"/>
+              <a:buFont typeface="Wingdings" pitchFamily="2" charset="2"/>
+              <a:buChar char="u"/>
+            </a:pPr>
+            <a:r>
+              <a:rPr lang="en-US" altLang="zh-TW" sz="1200" b="1" dirty="0">
+                <a:solidFill>
+                  <a:schemeClr val="tx1"/>
+                </a:solidFill>
+                <a:latin typeface="+mj-lt"/>
+              </a:rPr>
+              <a:t>&gt;    }</a:t>
+            </a:r>
+          </a:p>
+          <a:p>
+            <a:pPr marL="342900" indent="-342900" algn="l">
+              <a:buClr>
+                <a:srgbClr val="0070C0"/>
+              </a:buClr>
+              <a:buSzPct val="80000"/>
+              <a:buFont typeface="Wingdings" pitchFamily="2" charset="2"/>
+              <a:buChar char="u"/>
+            </a:pPr>
+            <a:r>
+              <a:rPr lang="en-US" altLang="zh-TW" sz="1200" b="1" dirty="0">
+                <a:solidFill>
+                  <a:schemeClr val="tx1"/>
+                </a:solidFill>
+                <a:latin typeface="+mj-lt"/>
+              </a:rPr>
+              <a:t>&gt;}</a:t>
+            </a:r>
+          </a:p>
+          <a:p>
+            <a:pPr marL="342900" indent="-342900" algn="l">
+              <a:buClr>
+                <a:srgbClr val="0070C0"/>
+              </a:buClr>
+              <a:buSzPct val="80000"/>
+              <a:buFont typeface="Wingdings" pitchFamily="2" charset="2"/>
+              <a:buChar char="u"/>
+            </a:pPr>
+            <a:endParaRPr lang="en-US" altLang="zh-TW" sz="1200" b="1" dirty="0">
+              <a:solidFill>
+                <a:schemeClr val="tx1"/>
+              </a:solidFill>
+              <a:latin typeface="+mj-lt"/>
+            </a:endParaRPr>
+          </a:p>
+        </p:txBody>
+      </p:sp>
+      <p:sp>
+        <p:nvSpPr>
+          <p:cNvPr id="4" name="標題 1"/>
+          <p:cNvSpPr txBox="1">
+            <a:spLocks/>
+          </p:cNvSpPr>
+          <p:nvPr/>
+        </p:nvSpPr>
+        <p:spPr>
+          <a:xfrm>
+            <a:off x="0" y="764704"/>
+            <a:ext cx="9144000" cy="398616"/>
+          </a:xfrm>
+          <a:prstGeom prst="rect">
+            <a:avLst/>
+          </a:prstGeom>
+          <a:gradFill flip="none" rotWithShape="1">
+            <a:gsLst>
+              <a:gs pos="0">
+                <a:srgbClr val="00B0F0">
+                  <a:shade val="30000"/>
+                  <a:satMod val="115000"/>
+                </a:srgbClr>
+              </a:gs>
+              <a:gs pos="50000">
+                <a:srgbClr val="00B0F0">
+                  <a:shade val="67500"/>
+                  <a:satMod val="115000"/>
+                </a:srgbClr>
+              </a:gs>
+              <a:gs pos="100000">
+                <a:srgbClr val="00B0F0">
+                  <a:shade val="100000"/>
+                  <a:satMod val="115000"/>
+                </a:srgbClr>
+              </a:gs>
+            </a:gsLst>
+            <a:path path="circle">
+              <a:fillToRect t="100000" r="100000"/>
+            </a:path>
+            <a:tileRect l="-100000" b="-100000"/>
+          </a:gradFill>
+        </p:spPr>
+        <p:txBody>
+          <a:bodyPr vert="horz" lIns="91440" tIns="45720" rIns="91440" bIns="45720" rtlCol="0" anchor="ctr">
+            <a:normAutofit/>
+          </a:bodyPr>
+          <a:lstStyle/>
+          <a:p>
+            <a:r>
+              <a:rPr lang="en-US" sz="1600" dirty="0">
+                <a:hlinkClick r:id="rId2"/>
+              </a:rPr>
+              <a:t>https://www.youtube.com/watch?v=uirRaVjRsf4&amp;list=PLC3y8-rFHvwgg3vaYJgHGnModB54rxOk3&amp;index=11</a:t>
+            </a:r>
+            <a:endParaRPr lang="en-US" altLang="zh-TW" sz="1600" b="1" i="1" dirty="0"/>
+          </a:p>
+        </p:txBody>
+      </p:sp>
+      <p:sp>
+        <p:nvSpPr>
+          <p:cNvPr id="5" name="日期版面配置區 4"/>
+          <p:cNvSpPr>
+            <a:spLocks noGrp="1"/>
+          </p:cNvSpPr>
+          <p:nvPr>
+            <p:ph type="dt" sz="half" idx="10"/>
+          </p:nvPr>
+        </p:nvSpPr>
+        <p:spPr>
+          <a:xfrm>
+            <a:off x="457200" y="6356350"/>
+            <a:ext cx="2133600" cy="404246"/>
+          </a:xfrm>
+        </p:spPr>
+        <p:txBody>
+          <a:bodyPr/>
+          <a:lstStyle/>
+          <a:p>
+            <a:fld id="{A4F910E6-8D00-4BAF-8C48-9688E0B449D3}" type="datetime1">
+              <a:rPr lang="zh-TW" altLang="en-US" smtClean="0"/>
+              <a:pPr/>
+              <a:t>2020/6/28</a:t>
+            </a:fld>
+            <a:endParaRPr lang="zh-TW" altLang="en-US"/>
+          </a:p>
+        </p:txBody>
+      </p:sp>
+      <p:sp>
+        <p:nvSpPr>
+          <p:cNvPr id="6" name="投影片編號版面配置區 5"/>
+          <p:cNvSpPr>
+            <a:spLocks noGrp="1"/>
+          </p:cNvSpPr>
+          <p:nvPr>
+            <p:ph type="sldNum" sz="quarter" idx="12"/>
+          </p:nvPr>
+        </p:nvSpPr>
+        <p:spPr>
+          <a:xfrm>
+            <a:off x="6553200" y="6356350"/>
+            <a:ext cx="2133600" cy="404246"/>
+          </a:xfrm>
+        </p:spPr>
+        <p:txBody>
+          <a:bodyPr/>
+          <a:lstStyle/>
+          <a:p>
+            <a:fld id="{E4D7E63D-91F2-4366-A2C4-1B00C9E2590E}" type="slidenum">
+              <a:rPr lang="zh-TW" altLang="en-US" smtClean="0"/>
+              <a:pPr/>
+              <a:t>27</a:t>
+            </a:fld>
+            <a:endParaRPr lang="zh-TW" altLang="en-US"/>
+          </a:p>
+        </p:txBody>
+      </p:sp>
+    </p:spTree>
+    <p:extLst>
+      <p:ext uri="{BB962C8B-B14F-4D97-AF65-F5344CB8AC3E}">
+        <p14:creationId xmlns:p14="http://schemas.microsoft.com/office/powerpoint/2010/main" val="307075816"/>
+      </p:ext>
+    </p:extLst>
+  </p:cSld>
+  <p:clrMapOvr>
+    <a:masterClrMapping/>
+  </p:clrMapOvr>
+</p:sld>
+</file>
+
+<file path=ppt/slides/slide28.xml><?xml version="1.0" encoding="utf-8"?>
+<p:sld xmlns:a="http://schemas.openxmlformats.org/drawingml/2006/main" xmlns:r="http://schemas.openxmlformats.org/officeDocument/2006/relationships" xmlns:p="http://schemas.openxmlformats.org/presentationml/2006/main">
+  <p:cSld>
+    <p:spTree>
+      <p:nvGrpSpPr>
+        <p:cNvPr id="1" name=""/>
+        <p:cNvGrpSpPr/>
+        <p:nvPr/>
+      </p:nvGrpSpPr>
+      <p:grpSpPr>
+        <a:xfrm>
+          <a:off x="0" y="0"/>
+          <a:ext cx="0" cy="0"/>
+          <a:chOff x="0" y="0"/>
+          <a:chExt cx="0" cy="0"/>
+        </a:xfrm>
+      </p:grpSpPr>
+      <p:sp>
+        <p:nvSpPr>
+          <p:cNvPr id="2" name="標題 1"/>
+          <p:cNvSpPr>
+            <a:spLocks noGrp="1"/>
+          </p:cNvSpPr>
+          <p:nvPr>
+            <p:ph type="ctrTitle"/>
+          </p:nvPr>
+        </p:nvSpPr>
+        <p:spPr>
+          <a:xfrm>
+            <a:off x="0" y="2130425"/>
+            <a:ext cx="9144000" cy="1470025"/>
+          </a:xfrm>
+          <a:gradFill flip="none" rotWithShape="1">
+            <a:gsLst>
+              <a:gs pos="0">
+                <a:srgbClr val="00B0F0">
+                  <a:shade val="30000"/>
+                  <a:satMod val="115000"/>
+                </a:srgbClr>
+              </a:gs>
+              <a:gs pos="50000">
+                <a:srgbClr val="00B0F0">
+                  <a:shade val="67500"/>
+                  <a:satMod val="115000"/>
+                </a:srgbClr>
+              </a:gs>
+              <a:gs pos="100000">
+                <a:srgbClr val="00B0F0">
+                  <a:shade val="100000"/>
+                  <a:satMod val="115000"/>
+                </a:srgbClr>
+              </a:gs>
+            </a:gsLst>
+            <a:path path="circle">
+              <a:fillToRect t="100000" r="100000"/>
+            </a:path>
+            <a:tileRect l="-100000" b="-100000"/>
+          </a:gradFill>
+        </p:spPr>
+        <p:txBody>
+          <a:bodyPr>
+            <a:normAutofit/>
+          </a:bodyPr>
+          <a:lstStyle/>
+          <a:p>
+            <a:r>
+              <a:rPr lang="en-US" altLang="zh-TW" sz="6000" b="1" dirty="0">
+                <a:solidFill>
+                  <a:srgbClr val="FFFF00"/>
+                </a:solidFill>
+              </a:rPr>
+              <a:t>End of Chapter</a:t>
+            </a:r>
+            <a:endParaRPr lang="zh-TW" altLang="en-US" sz="6000" b="1" dirty="0">
+              <a:solidFill>
+                <a:srgbClr val="FFFF00"/>
+              </a:solidFill>
+            </a:endParaRPr>
+          </a:p>
+        </p:txBody>
+      </p:sp>
+      <p:sp>
+        <p:nvSpPr>
+          <p:cNvPr id="5" name="日期版面配置區 4"/>
+          <p:cNvSpPr>
+            <a:spLocks noGrp="1"/>
+          </p:cNvSpPr>
+          <p:nvPr>
+            <p:ph type="dt" sz="half" idx="10"/>
+          </p:nvPr>
+        </p:nvSpPr>
+        <p:spPr/>
+        <p:txBody>
+          <a:bodyPr/>
+          <a:lstStyle/>
+          <a:p>
+            <a:fld id="{4E46BE27-E923-4EC2-B046-3272AE2A3E5C}" type="datetime1">
+              <a:rPr lang="zh-TW" altLang="en-US" smtClean="0"/>
+              <a:pPr/>
+              <a:t>2020/6/28</a:t>
+            </a:fld>
+            <a:endParaRPr lang="zh-TW" altLang="en-US"/>
+          </a:p>
+        </p:txBody>
+      </p:sp>
+      <p:sp>
+        <p:nvSpPr>
+          <p:cNvPr id="6" name="投影片編號版面配置區 5"/>
+          <p:cNvSpPr>
+            <a:spLocks noGrp="1"/>
+          </p:cNvSpPr>
+          <p:nvPr>
+            <p:ph type="sldNum" sz="quarter" idx="12"/>
+          </p:nvPr>
+        </p:nvSpPr>
+        <p:spPr/>
+        <p:txBody>
+          <a:bodyPr/>
+          <a:lstStyle/>
+          <a:p>
+            <a:fld id="{E4D7E63D-91F2-4366-A2C4-1B00C9E2590E}" type="slidenum">
+              <a:rPr lang="zh-TW" altLang="en-US" smtClean="0"/>
+              <a:pPr/>
+              <a:t>28</a:t>
+            </a:fld>
+            <a:endParaRPr lang="zh-TW" altLang="en-US"/>
+          </a:p>
+        </p:txBody>
+      </p:sp>
+    </p:spTree>
+  </p:cSld>
+  <p:clrMapOvr>
+    <a:masterClrMapping/>
+  </p:clrMapOvr>
+</p:sld>
+</file>
+
+<file path=ppt/slides/slide3.xml><?xml version="1.0" encoding="utf-8"?>
+<p:sld xmlns:a="http://schemas.openxmlformats.org/drawingml/2006/main" xmlns:r="http://schemas.openxmlformats.org/officeDocument/2006/relationships" xmlns:p="http://schemas.openxmlformats.org/presentationml/2006/main">
+  <p:cSld>
+    <p:spTree>
+      <p:nvGrpSpPr>
+        <p:cNvPr id="1" name=""/>
+        <p:cNvGrpSpPr/>
+        <p:nvPr/>
+      </p:nvGrpSpPr>
+      <p:grpSpPr>
+        <a:xfrm>
+          <a:off x="0" y="0"/>
+          <a:ext cx="0" cy="0"/>
+          <a:chOff x="0" y="0"/>
+          <a:chExt cx="0" cy="0"/>
+        </a:xfrm>
+      </p:grpSpPr>
+      <p:sp>
+        <p:nvSpPr>
+          <p:cNvPr id="2" name="標題 1"/>
+          <p:cNvSpPr>
+            <a:spLocks noGrp="1"/>
+          </p:cNvSpPr>
+          <p:nvPr>
+            <p:ph type="ctrTitle"/>
+          </p:nvPr>
+        </p:nvSpPr>
+        <p:spPr>
+          <a:xfrm>
+            <a:off x="0" y="1"/>
+            <a:ext cx="9144000" cy="764704"/>
+          </a:xfrm>
+          <a:gradFill flip="none" rotWithShape="1">
+            <a:gsLst>
+              <a:gs pos="0">
+                <a:srgbClr val="C00000">
+                  <a:shade val="30000"/>
+                  <a:satMod val="115000"/>
+                </a:srgbClr>
+              </a:gs>
+              <a:gs pos="50000">
+                <a:srgbClr val="C00000">
+                  <a:shade val="67500"/>
+                  <a:satMod val="115000"/>
+                </a:srgbClr>
+              </a:gs>
+              <a:gs pos="100000">
+                <a:srgbClr val="C00000">
+                  <a:shade val="100000"/>
+                  <a:satMod val="115000"/>
+                </a:srgbClr>
+              </a:gs>
+            </a:gsLst>
+            <a:path path="circle">
+              <a:fillToRect t="100000" r="100000"/>
+            </a:path>
+            <a:tileRect l="-100000" b="-100000"/>
+          </a:gradFill>
+        </p:spPr>
+        <p:txBody>
+          <a:bodyPr>
+            <a:normAutofit/>
+          </a:bodyPr>
+          <a:lstStyle/>
+          <a:p>
+            <a:pPr algn="l"/>
+            <a:r>
+              <a:rPr lang="en-US" altLang="zh-TW" b="1" dirty="0">
+                <a:solidFill>
+                  <a:srgbClr val="FFFF00"/>
+                </a:solidFill>
+              </a:rPr>
+              <a:t>11 </a:t>
+            </a:r>
+            <a:r>
+              <a:rPr lang="en-US" altLang="zh-TW" b="1" dirty="0" err="1">
+                <a:solidFill>
+                  <a:srgbClr val="FFFF00"/>
+                </a:solidFill>
+              </a:rPr>
+              <a:t>setState</a:t>
+            </a:r>
+            <a:endParaRPr lang="zh-TW" altLang="en-US" b="1" dirty="0">
+              <a:solidFill>
+                <a:srgbClr val="FFFF00"/>
+              </a:solidFill>
+            </a:endParaRPr>
+          </a:p>
+        </p:txBody>
+      </p:sp>
+      <p:sp>
+        <p:nvSpPr>
+          <p:cNvPr id="3" name="副標題 2"/>
+          <p:cNvSpPr>
+            <a:spLocks noGrp="1"/>
+          </p:cNvSpPr>
+          <p:nvPr>
+            <p:ph type="subTitle" idx="1"/>
+          </p:nvPr>
+        </p:nvSpPr>
+        <p:spPr>
+          <a:xfrm>
+            <a:off x="467544" y="1340764"/>
+            <a:ext cx="8219256" cy="1496303"/>
+          </a:xfrm>
+          <a:ln>
+            <a:solidFill>
+              <a:srgbClr val="C00000"/>
+            </a:solidFill>
+          </a:ln>
+        </p:spPr>
+        <p:txBody>
+          <a:bodyPr>
+            <a:noAutofit/>
+          </a:bodyPr>
+          <a:lstStyle/>
+          <a:p>
+            <a:pPr marL="342900" indent="-342900" algn="l">
+              <a:buClr>
+                <a:srgbClr val="0070C0"/>
+              </a:buClr>
+              <a:buSzPct val="80000"/>
+              <a:buFont typeface="Wingdings" pitchFamily="2" charset="2"/>
+              <a:buChar char="u"/>
+            </a:pPr>
+            <a:r>
+              <a:rPr lang="en-US" altLang="zh-TW" sz="1600" b="1" dirty="0">
+                <a:solidFill>
+                  <a:schemeClr val="tx1"/>
+                </a:solidFill>
+                <a:latin typeface="+mj-lt"/>
+              </a:rPr>
+              <a:t>Set state in React:</a:t>
+            </a:r>
+          </a:p>
+          <a:p>
+            <a:pPr marL="342900" indent="-342900" algn="l">
+              <a:buClr>
+                <a:srgbClr val="0070C0"/>
+              </a:buClr>
+              <a:buSzPct val="80000"/>
+              <a:buFont typeface="Wingdings" pitchFamily="2" charset="2"/>
+              <a:buChar char="u"/>
+            </a:pPr>
+            <a:r>
+              <a:rPr lang="en-US" altLang="zh-TW" sz="1600" b="1" dirty="0">
+                <a:solidFill>
+                  <a:schemeClr val="tx1"/>
+                </a:solidFill>
+                <a:latin typeface="+mj-lt"/>
+              </a:rPr>
+              <a:t>We create a counter component in this discussion: </a:t>
+            </a:r>
+          </a:p>
+          <a:p>
+            <a:pPr marL="342900" indent="-342900" algn="l">
+              <a:buClr>
+                <a:srgbClr val="0070C0"/>
+              </a:buClr>
+              <a:buSzPct val="80000"/>
+              <a:buFont typeface="Wingdings" pitchFamily="2" charset="2"/>
+              <a:buChar char="u"/>
+            </a:pPr>
+            <a:r>
+              <a:rPr lang="en-US" altLang="zh-TW" sz="1600" b="1" dirty="0">
+                <a:solidFill>
+                  <a:schemeClr val="tx1"/>
+                </a:solidFill>
+                <a:latin typeface="+mj-lt"/>
+              </a:rPr>
+              <a:t>We have counter value and Create a button to increment the counter value.</a:t>
+            </a:r>
+          </a:p>
+          <a:p>
+            <a:pPr marL="342900" indent="-342900" algn="l">
+              <a:buClr>
+                <a:srgbClr val="0070C0"/>
+              </a:buClr>
+              <a:buSzPct val="80000"/>
+              <a:buFont typeface="Wingdings" pitchFamily="2" charset="2"/>
+              <a:buChar char="u"/>
+            </a:pPr>
+            <a:r>
+              <a:rPr lang="en-US" altLang="zh-TW" sz="1600" b="1" dirty="0">
+                <a:solidFill>
+                  <a:schemeClr val="tx1"/>
+                </a:solidFill>
+                <a:latin typeface="+mj-lt"/>
+              </a:rPr>
+              <a:t>Create Counter.js.</a:t>
+            </a:r>
+          </a:p>
+          <a:p>
+            <a:pPr marL="342900" indent="-342900" algn="l">
+              <a:buClr>
+                <a:srgbClr val="0070C0"/>
+              </a:buClr>
+              <a:buSzPct val="80000"/>
+              <a:buFont typeface="Wingdings" pitchFamily="2" charset="2"/>
+              <a:buChar char="u"/>
+            </a:pPr>
+            <a:r>
+              <a:rPr lang="en-US" altLang="zh-TW" sz="1600" b="1" dirty="0">
+                <a:solidFill>
+                  <a:schemeClr val="tx1"/>
+                </a:solidFill>
+                <a:latin typeface="+mj-lt"/>
+              </a:rPr>
+              <a:t>We are learning the state in class components. This is going to be a class component as well.</a:t>
+            </a:r>
+          </a:p>
+        </p:txBody>
+      </p:sp>
+      <p:sp>
+        <p:nvSpPr>
+          <p:cNvPr id="4" name="標題 1"/>
+          <p:cNvSpPr txBox="1">
+            <a:spLocks/>
+          </p:cNvSpPr>
+          <p:nvPr/>
+        </p:nvSpPr>
+        <p:spPr>
+          <a:xfrm>
+            <a:off x="0" y="764704"/>
+            <a:ext cx="9144000" cy="398616"/>
+          </a:xfrm>
+          <a:prstGeom prst="rect">
+            <a:avLst/>
+          </a:prstGeom>
+          <a:gradFill flip="none" rotWithShape="1">
+            <a:gsLst>
+              <a:gs pos="0">
+                <a:srgbClr val="00B0F0">
+                  <a:shade val="30000"/>
+                  <a:satMod val="115000"/>
+                </a:srgbClr>
+              </a:gs>
+              <a:gs pos="50000">
+                <a:srgbClr val="00B0F0">
+                  <a:shade val="67500"/>
+                  <a:satMod val="115000"/>
+                </a:srgbClr>
+              </a:gs>
+              <a:gs pos="100000">
+                <a:srgbClr val="00B0F0">
+                  <a:shade val="100000"/>
+                  <a:satMod val="115000"/>
+                </a:srgbClr>
+              </a:gs>
+            </a:gsLst>
+            <a:path path="circle">
+              <a:fillToRect t="100000" r="100000"/>
+            </a:path>
+            <a:tileRect l="-100000" b="-100000"/>
+          </a:gradFill>
+        </p:spPr>
+        <p:txBody>
+          <a:bodyPr vert="horz" lIns="91440" tIns="45720" rIns="91440" bIns="45720" rtlCol="0" anchor="ctr">
+            <a:normAutofit/>
+          </a:bodyPr>
+          <a:lstStyle/>
+          <a:p>
+            <a:r>
+              <a:rPr lang="en-US" sz="1600" dirty="0">
+                <a:hlinkClick r:id="rId2"/>
+              </a:rPr>
+              <a:t>https://www.youtube.com/watch?v=uirRaVjRsf4&amp;list=PLC3y8-rFHvwgg3vaYJgHGnModB54rxOk3&amp;index=11</a:t>
+            </a:r>
+            <a:endParaRPr lang="en-US" altLang="zh-TW" sz="1600" b="1" i="1" dirty="0"/>
+          </a:p>
+        </p:txBody>
+      </p:sp>
+      <p:sp>
+        <p:nvSpPr>
+          <p:cNvPr id="5" name="日期版面配置區 4"/>
+          <p:cNvSpPr>
+            <a:spLocks noGrp="1"/>
+          </p:cNvSpPr>
+          <p:nvPr>
+            <p:ph type="dt" sz="half" idx="10"/>
+          </p:nvPr>
+        </p:nvSpPr>
+        <p:spPr>
+          <a:xfrm>
+            <a:off x="457200" y="6356350"/>
+            <a:ext cx="2133600" cy="404246"/>
+          </a:xfrm>
+        </p:spPr>
+        <p:txBody>
+          <a:bodyPr/>
+          <a:lstStyle/>
+          <a:p>
+            <a:fld id="{A4F910E6-8D00-4BAF-8C48-9688E0B449D3}" type="datetime1">
+              <a:rPr lang="zh-TW" altLang="en-US" smtClean="0"/>
+              <a:pPr/>
+              <a:t>2020/6/28</a:t>
             </a:fld>
             <a:endParaRPr lang="zh-TW" altLang="en-US"/>
           </a:p>
@@ -8835,7 +12767,7 @@
             <a:fld id="{A4F910E6-8D00-4BAF-8C48-9688E0B449D3}" type="datetime1">
               <a:rPr lang="zh-TW" altLang="en-US" smtClean="0"/>
               <a:pPr/>
-              <a:t>2020/4/5</a:t>
+              <a:t>2020/6/28</a:t>
             </a:fld>
             <a:endParaRPr lang="zh-TW" altLang="en-US"/>
           </a:p>
@@ -9295,7 +13227,7 @@
             <a:fld id="{A4F910E6-8D00-4BAF-8C48-9688E0B449D3}" type="datetime1">
               <a:rPr lang="zh-TW" altLang="en-US" smtClean="0"/>
               <a:pPr/>
-              <a:t>2020/4/5</a:t>
+              <a:t>2020/6/28</a:t>
             </a:fld>
             <a:endParaRPr lang="zh-TW" altLang="en-US"/>
           </a:p>
@@ -9669,7 +13601,7 @@
             <a:fld id="{A4F910E6-8D00-4BAF-8C48-9688E0B449D3}" type="datetime1">
               <a:rPr lang="zh-TW" altLang="en-US" smtClean="0"/>
               <a:pPr/>
-              <a:t>2020/4/5</a:t>
+              <a:t>2020/6/28</a:t>
             </a:fld>
             <a:endParaRPr lang="zh-TW" altLang="en-US"/>
           </a:p>
@@ -10027,7 +13959,7 @@
             <a:fld id="{A4F910E6-8D00-4BAF-8C48-9688E0B449D3}" type="datetime1">
               <a:rPr lang="zh-TW" altLang="en-US" smtClean="0"/>
               <a:pPr/>
-              <a:t>2020/4/5</a:t>
+              <a:t>2020/6/28</a:t>
             </a:fld>
             <a:endParaRPr lang="zh-TW" altLang="en-US"/>
           </a:p>
@@ -10436,7 +14368,7 @@
             <a:fld id="{A4F910E6-8D00-4BAF-8C48-9688E0B449D3}" type="datetime1">
               <a:rPr lang="zh-TW" altLang="en-US" smtClean="0"/>
               <a:pPr/>
-              <a:t>2020/4/5</a:t>
+              <a:t>2020/6/28</a:t>
             </a:fld>
             <a:endParaRPr lang="zh-TW" altLang="en-US"/>
           </a:p>
@@ -10639,36 +14571,6 @@
       </p:sp>
       <p:sp>
         <p:nvSpPr>
-          <p:cNvPr id="3" name="副標題 2"/>
-          <p:cNvSpPr>
-            <a:spLocks noGrp="1"/>
-          </p:cNvSpPr>
-          <p:nvPr>
-            <p:ph type="subTitle" idx="1"/>
-          </p:nvPr>
-        </p:nvSpPr>
-        <p:spPr>
-          <a:xfrm>
-            <a:off x="1259632" y="4581128"/>
-            <a:ext cx="6400800" cy="694928"/>
-          </a:xfrm>
-        </p:spPr>
-        <p:txBody>
-          <a:bodyPr>
-            <a:normAutofit/>
-          </a:bodyPr>
-          <a:lstStyle/>
-          <a:p>
-            <a:r>
-              <a:rPr lang="en-US" altLang="zh-TW" dirty="0"/>
-              <a:t>Peter H. Chen</a:t>
-            </a:r>
-            <a:endParaRPr lang="zh-TW" altLang="en-US" dirty="0"/>
-          </a:p>
-        </p:txBody>
-      </p:sp>
-      <p:sp>
-        <p:nvSpPr>
           <p:cNvPr id="5" name="日期版面配置區 4"/>
           <p:cNvSpPr>
             <a:spLocks noGrp="1"/>
@@ -10685,7 +14587,7 @@
             <a:fld id="{C389EDC9-19E3-47AC-9C57-C6A24DEA81AD}" type="datetime1">
               <a:rPr lang="zh-TW" altLang="en-US" smtClean="0"/>
               <a:pPr/>
-              <a:t>2020/4/5</a:t>
+              <a:t>2020/6/28</a:t>
             </a:fld>
             <a:endParaRPr lang="zh-TW" altLang="en-US"/>
           </a:p>

</xml_diff>